<commit_message>
Add Technical Detail Page
</commit_message>
<xml_diff>
--- a/mock/HandOut.pptx
+++ b/mock/HandOut.pptx
@@ -1,6 +1,6 @@
 
 <file path=ppt/presentation.xml><?xml version="1.0" encoding="utf-8"?>
-<p:presentation xmlns:a="http://schemas.openxmlformats.org/drawingml/2006/main" xmlns:r="http://schemas.openxmlformats.org/officeDocument/2006/relationships" xmlns:p="http://schemas.openxmlformats.org/presentationml/2006/main" saveSubsetFonts="1">
+<p:presentation xmlns:a="http://schemas.openxmlformats.org/drawingml/2006/main" xmlns:r="http://schemas.openxmlformats.org/officeDocument/2006/relationships" xmlns:mc="http://schemas.openxmlformats.org/markup-compatibility/2006" xmlns:mv="urn:schemas-microsoft-com:mac:vml" xmlns:p="http://schemas.openxmlformats.org/presentationml/2006/main" mc:Ignorable="mv" mc:PreserveAttributes="mv:*" saveSubsetFonts="1">
   <p:sldMasterIdLst>
     <p:sldMasterId id="2147483648" r:id="rId1"/>
   </p:sldMasterIdLst>
@@ -127,17 +127,17 @@
   </p:defaultTextStyle>
   <p:extLst>
     <p:ext uri="{EFAFB233-063F-42B5-8137-9DF3F51BA10A}">
-      <p15:sldGuideLst xmlns:p15="http://schemas.microsoft.com/office/powerpoint/2012/main"/>
+      <p15:sldGuideLst xmlns:p15="http://schemas.microsoft.com/office/powerpoint/2012/main" xmlns:p="http://schemas.openxmlformats.org/presentationml/2006/main" xmlns:r="http://schemas.openxmlformats.org/officeDocument/2006/relationships" xmlns:a="http://schemas.openxmlformats.org/drawingml/2006/main" xmlns=""/>
     </p:ext>
     <p:ext uri="{2D200454-40CA-4A62-9FC3-DE9A4176ACB9}">
-      <p15:notesGuideLst xmlns:p15="http://schemas.microsoft.com/office/powerpoint/2012/main"/>
+      <p15:notesGuideLst xmlns:p15="http://schemas.microsoft.com/office/powerpoint/2012/main" xmlns:p="http://schemas.openxmlformats.org/presentationml/2006/main" xmlns:r="http://schemas.openxmlformats.org/officeDocument/2006/relationships" xmlns:a="http://schemas.openxmlformats.org/drawingml/2006/main" xmlns=""/>
     </p:ext>
   </p:extLst>
 </p:presentation>
 </file>
 
 <file path=ppt/handoutMasters/handoutMaster1.xml><?xml version="1.0" encoding="utf-8"?>
-<p:handoutMaster xmlns:a="http://schemas.openxmlformats.org/drawingml/2006/main" xmlns:r="http://schemas.openxmlformats.org/officeDocument/2006/relationships" xmlns:p="http://schemas.openxmlformats.org/presentationml/2006/main">
+<p:handoutMaster xmlns:a="http://schemas.openxmlformats.org/drawingml/2006/main" xmlns:r="http://schemas.openxmlformats.org/officeDocument/2006/relationships" xmlns:mc="http://schemas.openxmlformats.org/markup-compatibility/2006" xmlns:mv="urn:schemas-microsoft-com:mac:vml" xmlns:p="http://schemas.openxmlformats.org/presentationml/2006/main" mc:Ignorable="mv" mc:PreserveAttributes="mv:*">
   <p:cSld>
     <p:bg>
       <p:bgRef idx="1001">
@@ -218,7 +218,8 @@
           <a:p>
             <a:fld id="{2745F624-A099-4A85-8070-0FAF74F70416}" type="datetimeFigureOut">
               <a:rPr lang="zh-TW" altLang="en-US" smtClean="0"/>
-              <a:t>2015/9/13</a:t>
+              <a:pPr/>
+              <a:t>9/13/15</a:t>
             </a:fld>
             <a:endParaRPr lang="zh-TW" altLang="en-US"/>
           </a:p>
@@ -284,6 +285,7 @@
           <a:p>
             <a:fld id="{60830A98-3BC6-49A7-88B9-E48D6CC7D06D}" type="slidenum">
               <a:rPr lang="zh-TW" altLang="en-US" smtClean="0"/>
+              <a:pPr/>
               <a:t>‹#›</a:t>
             </a:fld>
             <a:endParaRPr lang="zh-TW" altLang="en-US"/>
@@ -293,7 +295,7 @@
     </p:spTree>
     <p:extLst>
       <p:ext uri="{BB962C8B-B14F-4D97-AF65-F5344CB8AC3E}">
-        <p14:creationId xmlns:p14="http://schemas.microsoft.com/office/powerpoint/2010/main" val="505329649"/>
+        <p14:creationId xmlns:p14="http://schemas.microsoft.com/office/powerpoint/2010/main" xmlns:p="http://schemas.openxmlformats.org/presentationml/2006/main" xmlns:r="http://schemas.openxmlformats.org/officeDocument/2006/relationships" xmlns:a="http://schemas.openxmlformats.org/drawingml/2006/main" xmlns="" val="505329649"/>
       </p:ext>
     </p:extLst>
   </p:cSld>
@@ -302,7 +304,7 @@
 </file>
 
 <file path=ppt/notesMasters/notesMaster1.xml><?xml version="1.0" encoding="utf-8"?>
-<p:notesMaster xmlns:a="http://schemas.openxmlformats.org/drawingml/2006/main" xmlns:r="http://schemas.openxmlformats.org/officeDocument/2006/relationships" xmlns:p="http://schemas.openxmlformats.org/presentationml/2006/main">
+<p:notesMaster xmlns:a="http://schemas.openxmlformats.org/drawingml/2006/main" xmlns:r="http://schemas.openxmlformats.org/officeDocument/2006/relationships" xmlns:mc="http://schemas.openxmlformats.org/markup-compatibility/2006" xmlns:mv="urn:schemas-microsoft-com:mac:vml" xmlns:p="http://schemas.openxmlformats.org/presentationml/2006/main" mc:Ignorable="mv" mc:PreserveAttributes="mv:*">
   <p:cSld>
     <p:bg>
       <p:bgRef idx="1001">
@@ -383,7 +385,8 @@
           <a:p>
             <a:fld id="{F6596A9D-5E78-4050-9E77-979F33127B03}" type="datetimeFigureOut">
               <a:rPr lang="zh-TW" altLang="en-US" smtClean="0"/>
-              <a:t>2015/9/13</a:t>
+              <a:pPr/>
+              <a:t>9/13/15</a:t>
             </a:fld>
             <a:endParaRPr lang="zh-TW" altLang="en-US"/>
           </a:p>
@@ -542,6 +545,7 @@
           <a:p>
             <a:fld id="{BFDB7E94-BF3F-40F8-816A-B642B5920AE9}" type="slidenum">
               <a:rPr lang="zh-TW" altLang="en-US" smtClean="0"/>
+              <a:pPr/>
               <a:t>‹#›</a:t>
             </a:fld>
             <a:endParaRPr lang="zh-TW" altLang="en-US"/>
@@ -551,7 +555,7 @@
     </p:spTree>
     <p:extLst>
       <p:ext uri="{BB962C8B-B14F-4D97-AF65-F5344CB8AC3E}">
-        <p14:creationId xmlns:p14="http://schemas.microsoft.com/office/powerpoint/2010/main" val="1468704247"/>
+        <p14:creationId xmlns:p14="http://schemas.microsoft.com/office/powerpoint/2010/main" xmlns:p="http://schemas.openxmlformats.org/presentationml/2006/main" xmlns:r="http://schemas.openxmlformats.org/officeDocument/2006/relationships" xmlns:a="http://schemas.openxmlformats.org/drawingml/2006/main" xmlns="" val="1468704247"/>
       </p:ext>
     </p:extLst>
   </p:cSld>
@@ -652,7 +656,7 @@
 </file>
 
 <file path=ppt/slideLayouts/slideLayout1.xml><?xml version="1.0" encoding="utf-8"?>
-<p:sldLayout xmlns:a="http://schemas.openxmlformats.org/drawingml/2006/main" xmlns:r="http://schemas.openxmlformats.org/officeDocument/2006/relationships" xmlns:p="http://schemas.openxmlformats.org/presentationml/2006/main" type="title" preserve="1">
+<p:sldLayout xmlns:a="http://schemas.openxmlformats.org/drawingml/2006/main" xmlns:r="http://schemas.openxmlformats.org/officeDocument/2006/relationships" xmlns:mc="http://schemas.openxmlformats.org/markup-compatibility/2006" xmlns:mv="urn:schemas-microsoft-com:mac:vml" xmlns:p="http://schemas.openxmlformats.org/presentationml/2006/main" mc:Ignorable="mv" mc:PreserveAttributes="mv:*" type="title" preserve="1">
   <p:cSld name="標題投影片">
     <p:spTree>
       <p:nvGrpSpPr>
@@ -782,7 +786,8 @@
           <a:p>
             <a:fld id="{6130D9F5-3FA3-4911-BEB1-6E950BEF40EE}" type="datetimeFigureOut">
               <a:rPr lang="zh-TW" altLang="en-US" smtClean="0"/>
-              <a:t>2015/9/13</a:t>
+              <a:pPr/>
+              <a:t>9/13/15</a:t>
             </a:fld>
             <a:endParaRPr lang="zh-TW" altLang="en-US"/>
           </a:p>
@@ -824,6 +829,7 @@
           <a:p>
             <a:fld id="{C5C5FEA7-D34B-4903-B5C5-B5834C7353FC}" type="slidenum">
               <a:rPr lang="zh-TW" altLang="en-US" smtClean="0"/>
+              <a:pPr/>
               <a:t>‹#›</a:t>
             </a:fld>
             <a:endParaRPr lang="zh-TW" altLang="en-US"/>
@@ -833,7 +839,7 @@
     </p:spTree>
     <p:extLst>
       <p:ext uri="{BB962C8B-B14F-4D97-AF65-F5344CB8AC3E}">
-        <p14:creationId xmlns:p14="http://schemas.microsoft.com/office/powerpoint/2010/main" val="2757947320"/>
+        <p14:creationId xmlns:p14="http://schemas.microsoft.com/office/powerpoint/2010/main" xmlns:p="http://schemas.openxmlformats.org/presentationml/2006/main" xmlns:r="http://schemas.openxmlformats.org/officeDocument/2006/relationships" xmlns:a="http://schemas.openxmlformats.org/drawingml/2006/main" xmlns="" val="2757947320"/>
       </p:ext>
     </p:extLst>
   </p:cSld>
@@ -851,7 +857,7 @@
 </file>
 
 <file path=ppt/slideLayouts/slideLayout10.xml><?xml version="1.0" encoding="utf-8"?>
-<p:sldLayout xmlns:a="http://schemas.openxmlformats.org/drawingml/2006/main" xmlns:r="http://schemas.openxmlformats.org/officeDocument/2006/relationships" xmlns:p="http://schemas.openxmlformats.org/presentationml/2006/main" type="picTx" preserve="1">
+<p:sldLayout xmlns:a="http://schemas.openxmlformats.org/drawingml/2006/main" xmlns:r="http://schemas.openxmlformats.org/officeDocument/2006/relationships" xmlns:mc="http://schemas.openxmlformats.org/markup-compatibility/2006" xmlns:mv="urn:schemas-microsoft-com:mac:vml" xmlns:p="http://schemas.openxmlformats.org/presentationml/2006/main" mc:Ignorable="mv" mc:PreserveAttributes="mv:*" type="picTx" preserve="1">
   <p:cSld name="含標題的圖片">
     <p:spTree>
       <p:nvGrpSpPr>
@@ -1042,7 +1048,8 @@
           <a:p>
             <a:fld id="{6130D9F5-3FA3-4911-BEB1-6E950BEF40EE}" type="datetimeFigureOut">
               <a:rPr lang="zh-TW" altLang="en-US" smtClean="0"/>
-              <a:t>2015/9/13</a:t>
+              <a:pPr/>
+              <a:t>9/13/15</a:t>
             </a:fld>
             <a:endParaRPr lang="zh-TW" altLang="en-US"/>
           </a:p>
@@ -1084,6 +1091,7 @@
           <a:p>
             <a:fld id="{C5C5FEA7-D34B-4903-B5C5-B5834C7353FC}" type="slidenum">
               <a:rPr lang="zh-TW" altLang="en-US" smtClean="0"/>
+              <a:pPr/>
               <a:t>‹#›</a:t>
             </a:fld>
             <a:endParaRPr lang="zh-TW" altLang="en-US"/>
@@ -1093,7 +1101,7 @@
     </p:spTree>
     <p:extLst>
       <p:ext uri="{BB962C8B-B14F-4D97-AF65-F5344CB8AC3E}">
-        <p14:creationId xmlns:p14="http://schemas.microsoft.com/office/powerpoint/2010/main" val="1547161483"/>
+        <p14:creationId xmlns:p14="http://schemas.microsoft.com/office/powerpoint/2010/main" xmlns:p="http://schemas.openxmlformats.org/presentationml/2006/main" xmlns:r="http://schemas.openxmlformats.org/officeDocument/2006/relationships" xmlns:a="http://schemas.openxmlformats.org/drawingml/2006/main" xmlns="" val="1547161483"/>
       </p:ext>
     </p:extLst>
   </p:cSld>
@@ -1104,7 +1112,7 @@
 </file>
 
 <file path=ppt/slideLayouts/slideLayout11.xml><?xml version="1.0" encoding="utf-8"?>
-<p:sldLayout xmlns:a="http://schemas.openxmlformats.org/drawingml/2006/main" xmlns:r="http://schemas.openxmlformats.org/officeDocument/2006/relationships" xmlns:p="http://schemas.openxmlformats.org/presentationml/2006/main" type="vertTx" preserve="1">
+<p:sldLayout xmlns:a="http://schemas.openxmlformats.org/drawingml/2006/main" xmlns:r="http://schemas.openxmlformats.org/officeDocument/2006/relationships" xmlns:mc="http://schemas.openxmlformats.org/markup-compatibility/2006" xmlns:mv="urn:schemas-microsoft-com:mac:vml" xmlns:p="http://schemas.openxmlformats.org/presentationml/2006/main" mc:Ignorable="mv" mc:PreserveAttributes="mv:*" type="vertTx" preserve="1">
   <p:cSld name="標題及直排文字">
     <p:spTree>
       <p:nvGrpSpPr>
@@ -1212,7 +1220,8 @@
           <a:p>
             <a:fld id="{6130D9F5-3FA3-4911-BEB1-6E950BEF40EE}" type="datetimeFigureOut">
               <a:rPr lang="zh-TW" altLang="en-US" smtClean="0"/>
-              <a:t>2015/9/13</a:t>
+              <a:pPr/>
+              <a:t>9/13/15</a:t>
             </a:fld>
             <a:endParaRPr lang="zh-TW" altLang="en-US"/>
           </a:p>
@@ -1254,6 +1263,7 @@
           <a:p>
             <a:fld id="{C5C5FEA7-D34B-4903-B5C5-B5834C7353FC}" type="slidenum">
               <a:rPr lang="zh-TW" altLang="en-US" smtClean="0"/>
+              <a:pPr/>
               <a:t>‹#›</a:t>
             </a:fld>
             <a:endParaRPr lang="zh-TW" altLang="en-US"/>
@@ -1263,7 +1273,7 @@
     </p:spTree>
     <p:extLst>
       <p:ext uri="{BB962C8B-B14F-4D97-AF65-F5344CB8AC3E}">
-        <p14:creationId xmlns:p14="http://schemas.microsoft.com/office/powerpoint/2010/main" val="3395857830"/>
+        <p14:creationId xmlns:p14="http://schemas.microsoft.com/office/powerpoint/2010/main" xmlns:p="http://schemas.openxmlformats.org/presentationml/2006/main" xmlns:r="http://schemas.openxmlformats.org/officeDocument/2006/relationships" xmlns:a="http://schemas.openxmlformats.org/drawingml/2006/main" xmlns="" val="3395857830"/>
       </p:ext>
     </p:extLst>
   </p:cSld>
@@ -1274,7 +1284,7 @@
 </file>
 
 <file path=ppt/slideLayouts/slideLayout12.xml><?xml version="1.0" encoding="utf-8"?>
-<p:sldLayout xmlns:a="http://schemas.openxmlformats.org/drawingml/2006/main" xmlns:r="http://schemas.openxmlformats.org/officeDocument/2006/relationships" xmlns:p="http://schemas.openxmlformats.org/presentationml/2006/main" type="vertTitleAndTx" preserve="1">
+<p:sldLayout xmlns:a="http://schemas.openxmlformats.org/drawingml/2006/main" xmlns:r="http://schemas.openxmlformats.org/officeDocument/2006/relationships" xmlns:mc="http://schemas.openxmlformats.org/markup-compatibility/2006" xmlns:mv="urn:schemas-microsoft-com:mac:vml" xmlns:p="http://schemas.openxmlformats.org/presentationml/2006/main" mc:Ignorable="mv" mc:PreserveAttributes="mv:*" type="vertTitleAndTx" preserve="1">
   <p:cSld name="直排標題及文字">
     <p:spTree>
       <p:nvGrpSpPr>
@@ -1392,7 +1402,8 @@
           <a:p>
             <a:fld id="{6130D9F5-3FA3-4911-BEB1-6E950BEF40EE}" type="datetimeFigureOut">
               <a:rPr lang="zh-TW" altLang="en-US" smtClean="0"/>
-              <a:t>2015/9/13</a:t>
+              <a:pPr/>
+              <a:t>9/13/15</a:t>
             </a:fld>
             <a:endParaRPr lang="zh-TW" altLang="en-US"/>
           </a:p>
@@ -1434,6 +1445,7 @@
           <a:p>
             <a:fld id="{C5C5FEA7-D34B-4903-B5C5-B5834C7353FC}" type="slidenum">
               <a:rPr lang="zh-TW" altLang="en-US" smtClean="0"/>
+              <a:pPr/>
               <a:t>‹#›</a:t>
             </a:fld>
             <a:endParaRPr lang="zh-TW" altLang="en-US"/>
@@ -1443,7 +1455,7 @@
     </p:spTree>
     <p:extLst>
       <p:ext uri="{BB962C8B-B14F-4D97-AF65-F5344CB8AC3E}">
-        <p14:creationId xmlns:p14="http://schemas.microsoft.com/office/powerpoint/2010/main" val="3362310139"/>
+        <p14:creationId xmlns:p14="http://schemas.microsoft.com/office/powerpoint/2010/main" xmlns:p="http://schemas.openxmlformats.org/presentationml/2006/main" xmlns:r="http://schemas.openxmlformats.org/officeDocument/2006/relationships" xmlns:a="http://schemas.openxmlformats.org/drawingml/2006/main" xmlns="" val="3362310139"/>
       </p:ext>
     </p:extLst>
   </p:cSld>
@@ -1454,7 +1466,7 @@
 </file>
 
 <file path=ppt/slideLayouts/slideLayout2.xml><?xml version="1.0" encoding="utf-8"?>
-<p:sldLayout xmlns:a="http://schemas.openxmlformats.org/drawingml/2006/main" xmlns:r="http://schemas.openxmlformats.org/officeDocument/2006/relationships" xmlns:p="http://schemas.openxmlformats.org/presentationml/2006/main" type="obj" preserve="1">
+<p:sldLayout xmlns:a="http://schemas.openxmlformats.org/drawingml/2006/main" xmlns:r="http://schemas.openxmlformats.org/officeDocument/2006/relationships" xmlns:mc="http://schemas.openxmlformats.org/markup-compatibility/2006" xmlns:mv="urn:schemas-microsoft-com:mac:vml" xmlns:p="http://schemas.openxmlformats.org/presentationml/2006/main" mc:Ignorable="mv" mc:PreserveAttributes="mv:*" type="obj" preserve="1">
   <p:cSld name="標題及物件">
     <p:spTree>
       <p:nvGrpSpPr>
@@ -1562,7 +1574,8 @@
           <a:p>
             <a:fld id="{6130D9F5-3FA3-4911-BEB1-6E950BEF40EE}" type="datetimeFigureOut">
               <a:rPr lang="zh-TW" altLang="en-US" smtClean="0"/>
-              <a:t>2015/9/13</a:t>
+              <a:pPr/>
+              <a:t>9/13/15</a:t>
             </a:fld>
             <a:endParaRPr lang="zh-TW" altLang="en-US"/>
           </a:p>
@@ -1604,6 +1617,7 @@
           <a:p>
             <a:fld id="{C5C5FEA7-D34B-4903-B5C5-B5834C7353FC}" type="slidenum">
               <a:rPr lang="zh-TW" altLang="en-US" smtClean="0"/>
+              <a:pPr/>
               <a:t>‹#›</a:t>
             </a:fld>
             <a:endParaRPr lang="zh-TW" altLang="en-US"/>
@@ -1613,7 +1627,7 @@
     </p:spTree>
     <p:extLst>
       <p:ext uri="{BB962C8B-B14F-4D97-AF65-F5344CB8AC3E}">
-        <p14:creationId xmlns:p14="http://schemas.microsoft.com/office/powerpoint/2010/main" val="1991417031"/>
+        <p14:creationId xmlns:p14="http://schemas.microsoft.com/office/powerpoint/2010/main" xmlns:p="http://schemas.openxmlformats.org/presentationml/2006/main" xmlns:r="http://schemas.openxmlformats.org/officeDocument/2006/relationships" xmlns:a="http://schemas.openxmlformats.org/drawingml/2006/main" xmlns="" val="1991417031"/>
       </p:ext>
     </p:extLst>
   </p:cSld>
@@ -1631,7 +1645,7 @@
 </file>
 
 <file path=ppt/slideLayouts/slideLayout3.xml><?xml version="1.0" encoding="utf-8"?>
-<p:sldLayout xmlns:a="http://schemas.openxmlformats.org/drawingml/2006/main" xmlns:r="http://schemas.openxmlformats.org/officeDocument/2006/relationships" xmlns:p="http://schemas.openxmlformats.org/presentationml/2006/main" type="secHead" preserve="1">
+<p:sldLayout xmlns:a="http://schemas.openxmlformats.org/drawingml/2006/main" xmlns:r="http://schemas.openxmlformats.org/officeDocument/2006/relationships" xmlns:mc="http://schemas.openxmlformats.org/markup-compatibility/2006" xmlns:mv="urn:schemas-microsoft-com:mac:vml" xmlns:p="http://schemas.openxmlformats.org/presentationml/2006/main" mc:Ignorable="mv" mc:PreserveAttributes="mv:*" type="secHead" preserve="1">
   <p:cSld name="章節標題">
     <p:spTree>
       <p:nvGrpSpPr>
@@ -1815,7 +1829,8 @@
           <a:p>
             <a:fld id="{6130D9F5-3FA3-4911-BEB1-6E950BEF40EE}" type="datetimeFigureOut">
               <a:rPr lang="zh-TW" altLang="en-US" smtClean="0"/>
-              <a:t>2015/9/13</a:t>
+              <a:pPr/>
+              <a:t>9/13/15</a:t>
             </a:fld>
             <a:endParaRPr lang="zh-TW" altLang="en-US"/>
           </a:p>
@@ -1857,6 +1872,7 @@
           <a:p>
             <a:fld id="{C5C5FEA7-D34B-4903-B5C5-B5834C7353FC}" type="slidenum">
               <a:rPr lang="zh-TW" altLang="en-US" smtClean="0"/>
+              <a:pPr/>
               <a:t>‹#›</a:t>
             </a:fld>
             <a:endParaRPr lang="zh-TW" altLang="en-US"/>
@@ -1866,7 +1882,7 @@
     </p:spTree>
     <p:extLst>
       <p:ext uri="{BB962C8B-B14F-4D97-AF65-F5344CB8AC3E}">
-        <p14:creationId xmlns:p14="http://schemas.microsoft.com/office/powerpoint/2010/main" val="3317520050"/>
+        <p14:creationId xmlns:p14="http://schemas.microsoft.com/office/powerpoint/2010/main" xmlns:p="http://schemas.openxmlformats.org/presentationml/2006/main" xmlns:r="http://schemas.openxmlformats.org/officeDocument/2006/relationships" xmlns:a="http://schemas.openxmlformats.org/drawingml/2006/main" xmlns="" val="3317520050"/>
       </p:ext>
     </p:extLst>
   </p:cSld>
@@ -1877,7 +1893,7 @@
 </file>
 
 <file path=ppt/slideLayouts/slideLayout4.xml><?xml version="1.0" encoding="utf-8"?>
-<p:sldLayout xmlns:a="http://schemas.openxmlformats.org/drawingml/2006/main" xmlns:r="http://schemas.openxmlformats.org/officeDocument/2006/relationships" xmlns:p="http://schemas.openxmlformats.org/presentationml/2006/main" type="twoObj" preserve="1">
+<p:sldLayout xmlns:a="http://schemas.openxmlformats.org/drawingml/2006/main" xmlns:r="http://schemas.openxmlformats.org/officeDocument/2006/relationships" xmlns:mc="http://schemas.openxmlformats.org/markup-compatibility/2006" xmlns:mv="urn:schemas-microsoft-com:mac:vml" xmlns:p="http://schemas.openxmlformats.org/presentationml/2006/main" mc:Ignorable="mv" mc:PreserveAttributes="mv:*" type="twoObj" preserve="1">
   <p:cSld name="兩項物件">
     <p:spTree>
       <p:nvGrpSpPr>
@@ -2047,7 +2063,8 @@
           <a:p>
             <a:fld id="{6130D9F5-3FA3-4911-BEB1-6E950BEF40EE}" type="datetimeFigureOut">
               <a:rPr lang="zh-TW" altLang="en-US" smtClean="0"/>
-              <a:t>2015/9/13</a:t>
+              <a:pPr/>
+              <a:t>9/13/15</a:t>
             </a:fld>
             <a:endParaRPr lang="zh-TW" altLang="en-US"/>
           </a:p>
@@ -2089,6 +2106,7 @@
           <a:p>
             <a:fld id="{C5C5FEA7-D34B-4903-B5C5-B5834C7353FC}" type="slidenum">
               <a:rPr lang="zh-TW" altLang="en-US" smtClean="0"/>
+              <a:pPr/>
               <a:t>‹#›</a:t>
             </a:fld>
             <a:endParaRPr lang="zh-TW" altLang="en-US"/>
@@ -2098,7 +2116,7 @@
     </p:spTree>
     <p:extLst>
       <p:ext uri="{BB962C8B-B14F-4D97-AF65-F5344CB8AC3E}">
-        <p14:creationId xmlns:p14="http://schemas.microsoft.com/office/powerpoint/2010/main" val="1944736116"/>
+        <p14:creationId xmlns:p14="http://schemas.microsoft.com/office/powerpoint/2010/main" xmlns:p="http://schemas.openxmlformats.org/presentationml/2006/main" xmlns:r="http://schemas.openxmlformats.org/officeDocument/2006/relationships" xmlns:a="http://schemas.openxmlformats.org/drawingml/2006/main" xmlns="" val="1944736116"/>
       </p:ext>
     </p:extLst>
   </p:cSld>
@@ -2109,7 +2127,7 @@
 </file>
 
 <file path=ppt/slideLayouts/slideLayout5.xml><?xml version="1.0" encoding="utf-8"?>
-<p:sldLayout xmlns:a="http://schemas.openxmlformats.org/drawingml/2006/main" xmlns:r="http://schemas.openxmlformats.org/officeDocument/2006/relationships" xmlns:p="http://schemas.openxmlformats.org/presentationml/2006/main" type="twoTxTwoObj" preserve="1">
+<p:sldLayout xmlns:a="http://schemas.openxmlformats.org/drawingml/2006/main" xmlns:r="http://schemas.openxmlformats.org/officeDocument/2006/relationships" xmlns:mc="http://schemas.openxmlformats.org/markup-compatibility/2006" xmlns:mv="urn:schemas-microsoft-com:mac:vml" xmlns:p="http://schemas.openxmlformats.org/presentationml/2006/main" mc:Ignorable="mv" mc:PreserveAttributes="mv:*" type="twoTxTwoObj" preserve="1">
   <p:cSld name="比對">
     <p:spTree>
       <p:nvGrpSpPr>
@@ -2414,7 +2432,8 @@
           <a:p>
             <a:fld id="{6130D9F5-3FA3-4911-BEB1-6E950BEF40EE}" type="datetimeFigureOut">
               <a:rPr lang="zh-TW" altLang="en-US" smtClean="0"/>
-              <a:t>2015/9/13</a:t>
+              <a:pPr/>
+              <a:t>9/13/15</a:t>
             </a:fld>
             <a:endParaRPr lang="zh-TW" altLang="en-US"/>
           </a:p>
@@ -2456,6 +2475,7 @@
           <a:p>
             <a:fld id="{C5C5FEA7-D34B-4903-B5C5-B5834C7353FC}" type="slidenum">
               <a:rPr lang="zh-TW" altLang="en-US" smtClean="0"/>
+              <a:pPr/>
               <a:t>‹#›</a:t>
             </a:fld>
             <a:endParaRPr lang="zh-TW" altLang="en-US"/>
@@ -2465,7 +2485,7 @@
     </p:spTree>
     <p:extLst>
       <p:ext uri="{BB962C8B-B14F-4D97-AF65-F5344CB8AC3E}">
-        <p14:creationId xmlns:p14="http://schemas.microsoft.com/office/powerpoint/2010/main" val="1876124549"/>
+        <p14:creationId xmlns:p14="http://schemas.microsoft.com/office/powerpoint/2010/main" xmlns:p="http://schemas.openxmlformats.org/presentationml/2006/main" xmlns:r="http://schemas.openxmlformats.org/officeDocument/2006/relationships" xmlns:a="http://schemas.openxmlformats.org/drawingml/2006/main" xmlns="" val="1876124549"/>
       </p:ext>
     </p:extLst>
   </p:cSld>
@@ -2476,7 +2496,7 @@
 </file>
 
 <file path=ppt/slideLayouts/slideLayout6.xml><?xml version="1.0" encoding="utf-8"?>
-<p:sldLayout xmlns:a="http://schemas.openxmlformats.org/drawingml/2006/main" xmlns:r="http://schemas.openxmlformats.org/officeDocument/2006/relationships" xmlns:p="http://schemas.openxmlformats.org/presentationml/2006/main" type="titleOnly" preserve="1">
+<p:sldLayout xmlns:a="http://schemas.openxmlformats.org/drawingml/2006/main" xmlns:r="http://schemas.openxmlformats.org/officeDocument/2006/relationships" xmlns:mc="http://schemas.openxmlformats.org/markup-compatibility/2006" xmlns:mv="urn:schemas-microsoft-com:mac:vml" xmlns:p="http://schemas.openxmlformats.org/presentationml/2006/main" mc:Ignorable="mv" mc:PreserveAttributes="mv:*" type="titleOnly" preserve="1">
   <p:cSld name="只有標題">
     <p:spTree>
       <p:nvGrpSpPr>
@@ -2532,7 +2552,8 @@
           <a:p>
             <a:fld id="{6130D9F5-3FA3-4911-BEB1-6E950BEF40EE}" type="datetimeFigureOut">
               <a:rPr lang="zh-TW" altLang="en-US" smtClean="0"/>
-              <a:t>2015/9/13</a:t>
+              <a:pPr/>
+              <a:t>9/13/15</a:t>
             </a:fld>
             <a:endParaRPr lang="zh-TW" altLang="en-US"/>
           </a:p>
@@ -2574,6 +2595,7 @@
           <a:p>
             <a:fld id="{C5C5FEA7-D34B-4903-B5C5-B5834C7353FC}" type="slidenum">
               <a:rPr lang="zh-TW" altLang="en-US" smtClean="0"/>
+              <a:pPr/>
               <a:t>‹#›</a:t>
             </a:fld>
             <a:endParaRPr lang="zh-TW" altLang="en-US"/>
@@ -2583,7 +2605,7 @@
     </p:spTree>
     <p:extLst>
       <p:ext uri="{BB962C8B-B14F-4D97-AF65-F5344CB8AC3E}">
-        <p14:creationId xmlns:p14="http://schemas.microsoft.com/office/powerpoint/2010/main" val="351776319"/>
+        <p14:creationId xmlns:p14="http://schemas.microsoft.com/office/powerpoint/2010/main" xmlns:p="http://schemas.openxmlformats.org/presentationml/2006/main" xmlns:r="http://schemas.openxmlformats.org/officeDocument/2006/relationships" xmlns:a="http://schemas.openxmlformats.org/drawingml/2006/main" xmlns="" val="351776319"/>
       </p:ext>
     </p:extLst>
   </p:cSld>
@@ -2601,7 +2623,7 @@
 </file>
 
 <file path=ppt/slideLayouts/slideLayout7.xml><?xml version="1.0" encoding="utf-8"?>
-<p:sldLayout xmlns:a="http://schemas.openxmlformats.org/drawingml/2006/main" xmlns:r="http://schemas.openxmlformats.org/officeDocument/2006/relationships" xmlns:p="http://schemas.openxmlformats.org/presentationml/2006/main" type="titleOnly" preserve="1">
+<p:sldLayout xmlns:a="http://schemas.openxmlformats.org/drawingml/2006/main" xmlns:r="http://schemas.openxmlformats.org/officeDocument/2006/relationships" xmlns:mc="http://schemas.openxmlformats.org/markup-compatibility/2006" xmlns:mv="urn:schemas-microsoft-com:mac:vml" xmlns:p="http://schemas.openxmlformats.org/presentationml/2006/main" mc:Ignorable="mv" mc:PreserveAttributes="mv:*" type="titleOnly" preserve="1">
   <p:cSld name="1_只有標題">
     <p:spTree>
       <p:nvGrpSpPr>
@@ -2657,7 +2679,8 @@
           <a:p>
             <a:fld id="{6130D9F5-3FA3-4911-BEB1-6E950BEF40EE}" type="datetimeFigureOut">
               <a:rPr lang="zh-TW" altLang="en-US" smtClean="0"/>
-              <a:t>2015/9/13</a:t>
+              <a:pPr/>
+              <a:t>9/13/15</a:t>
             </a:fld>
             <a:endParaRPr lang="zh-TW" altLang="en-US"/>
           </a:p>
@@ -2699,6 +2722,7 @@
           <a:p>
             <a:fld id="{C5C5FEA7-D34B-4903-B5C5-B5834C7353FC}" type="slidenum">
               <a:rPr lang="zh-TW" altLang="en-US" smtClean="0"/>
+              <a:pPr/>
               <a:t>‹#›</a:t>
             </a:fld>
             <a:endParaRPr lang="zh-TW" altLang="en-US"/>
@@ -2756,7 +2780,7 @@
     </p:spTree>
     <p:extLst>
       <p:ext uri="{BB962C8B-B14F-4D97-AF65-F5344CB8AC3E}">
-        <p14:creationId xmlns:p14="http://schemas.microsoft.com/office/powerpoint/2010/main" val="3251083403"/>
+        <p14:creationId xmlns:p14="http://schemas.microsoft.com/office/powerpoint/2010/main" xmlns:p="http://schemas.openxmlformats.org/presentationml/2006/main" xmlns:r="http://schemas.openxmlformats.org/officeDocument/2006/relationships" xmlns:a="http://schemas.openxmlformats.org/drawingml/2006/main" xmlns="" val="3251083403"/>
       </p:ext>
     </p:extLst>
   </p:cSld>
@@ -2774,7 +2798,7 @@
 </file>
 
 <file path=ppt/slideLayouts/slideLayout8.xml><?xml version="1.0" encoding="utf-8"?>
-<p:sldLayout xmlns:a="http://schemas.openxmlformats.org/drawingml/2006/main" xmlns:r="http://schemas.openxmlformats.org/officeDocument/2006/relationships" xmlns:p="http://schemas.openxmlformats.org/presentationml/2006/main" type="blank" preserve="1">
+<p:sldLayout xmlns:a="http://schemas.openxmlformats.org/drawingml/2006/main" xmlns:r="http://schemas.openxmlformats.org/officeDocument/2006/relationships" xmlns:mc="http://schemas.openxmlformats.org/markup-compatibility/2006" xmlns:mv="urn:schemas-microsoft-com:mac:vml" xmlns:p="http://schemas.openxmlformats.org/presentationml/2006/main" mc:Ignorable="mv" mc:PreserveAttributes="mv:*" type="blank" preserve="1">
   <p:cSld name="空白">
     <p:spTree>
       <p:nvGrpSpPr>
@@ -2807,7 +2831,8 @@
           <a:p>
             <a:fld id="{6130D9F5-3FA3-4911-BEB1-6E950BEF40EE}" type="datetimeFigureOut">
               <a:rPr lang="zh-TW" altLang="en-US" smtClean="0"/>
-              <a:t>2015/9/13</a:t>
+              <a:pPr/>
+              <a:t>9/13/15</a:t>
             </a:fld>
             <a:endParaRPr lang="zh-TW" altLang="en-US"/>
           </a:p>
@@ -2849,6 +2874,7 @@
           <a:p>
             <a:fld id="{C5C5FEA7-D34B-4903-B5C5-B5834C7353FC}" type="slidenum">
               <a:rPr lang="zh-TW" altLang="en-US" smtClean="0"/>
+              <a:pPr/>
               <a:t>‹#›</a:t>
             </a:fld>
             <a:endParaRPr lang="zh-TW" altLang="en-US"/>
@@ -2858,7 +2884,7 @@
     </p:spTree>
     <p:extLst>
       <p:ext uri="{BB962C8B-B14F-4D97-AF65-F5344CB8AC3E}">
-        <p14:creationId xmlns:p14="http://schemas.microsoft.com/office/powerpoint/2010/main" val="1309980964"/>
+        <p14:creationId xmlns:p14="http://schemas.microsoft.com/office/powerpoint/2010/main" xmlns:p="http://schemas.openxmlformats.org/presentationml/2006/main" xmlns:r="http://schemas.openxmlformats.org/officeDocument/2006/relationships" xmlns:a="http://schemas.openxmlformats.org/drawingml/2006/main" xmlns="" val="1309980964"/>
       </p:ext>
     </p:extLst>
   </p:cSld>
@@ -2876,7 +2902,7 @@
 </file>
 
 <file path=ppt/slideLayouts/slideLayout9.xml><?xml version="1.0" encoding="utf-8"?>
-<p:sldLayout xmlns:a="http://schemas.openxmlformats.org/drawingml/2006/main" xmlns:r="http://schemas.openxmlformats.org/officeDocument/2006/relationships" xmlns:p="http://schemas.openxmlformats.org/presentationml/2006/main" type="objTx" preserve="1">
+<p:sldLayout xmlns:a="http://schemas.openxmlformats.org/drawingml/2006/main" xmlns:r="http://schemas.openxmlformats.org/officeDocument/2006/relationships" xmlns:mc="http://schemas.openxmlformats.org/markup-compatibility/2006" xmlns:mv="urn:schemas-microsoft-com:mac:vml" xmlns:p="http://schemas.openxmlformats.org/presentationml/2006/main" mc:Ignorable="mv" mc:PreserveAttributes="mv:*" type="objTx" preserve="1">
   <p:cSld name="含標題的內容">
     <p:spTree>
       <p:nvGrpSpPr>
@@ -3091,7 +3117,8 @@
           <a:p>
             <a:fld id="{6130D9F5-3FA3-4911-BEB1-6E950BEF40EE}" type="datetimeFigureOut">
               <a:rPr lang="zh-TW" altLang="en-US" smtClean="0"/>
-              <a:t>2015/9/13</a:t>
+              <a:pPr/>
+              <a:t>9/13/15</a:t>
             </a:fld>
             <a:endParaRPr lang="zh-TW" altLang="en-US"/>
           </a:p>
@@ -3133,6 +3160,7 @@
           <a:p>
             <a:fld id="{C5C5FEA7-D34B-4903-B5C5-B5834C7353FC}" type="slidenum">
               <a:rPr lang="zh-TW" altLang="en-US" smtClean="0"/>
+              <a:pPr/>
               <a:t>‹#›</a:t>
             </a:fld>
             <a:endParaRPr lang="zh-TW" altLang="en-US"/>
@@ -3142,7 +3170,7 @@
     </p:spTree>
     <p:extLst>
       <p:ext uri="{BB962C8B-B14F-4D97-AF65-F5344CB8AC3E}">
-        <p14:creationId xmlns:p14="http://schemas.microsoft.com/office/powerpoint/2010/main" val="3835936840"/>
+        <p14:creationId xmlns:p14="http://schemas.microsoft.com/office/powerpoint/2010/main" xmlns:p="http://schemas.openxmlformats.org/presentationml/2006/main" xmlns:r="http://schemas.openxmlformats.org/officeDocument/2006/relationships" xmlns:a="http://schemas.openxmlformats.org/drawingml/2006/main" xmlns="" val="3835936840"/>
       </p:ext>
     </p:extLst>
   </p:cSld>
@@ -3160,7 +3188,7 @@
 </file>
 
 <file path=ppt/slideMasters/slideMaster1.xml><?xml version="1.0" encoding="utf-8"?>
-<p:sldMaster xmlns:a="http://schemas.openxmlformats.org/drawingml/2006/main" xmlns:r="http://schemas.openxmlformats.org/officeDocument/2006/relationships" xmlns:p="http://schemas.openxmlformats.org/presentationml/2006/main">
+<p:sldMaster xmlns:a="http://schemas.openxmlformats.org/drawingml/2006/main" xmlns:r="http://schemas.openxmlformats.org/officeDocument/2006/relationships" xmlns:mc="http://schemas.openxmlformats.org/markup-compatibility/2006" xmlns:mv="urn:schemas-microsoft-com:mac:vml" xmlns:p="http://schemas.openxmlformats.org/presentationml/2006/main" mc:Ignorable="mv" mc:PreserveAttributes="mv:*">
   <p:cSld>
     <p:bg>
       <p:bgRef idx="1001">
@@ -3311,7 +3339,8 @@
           <a:p>
             <a:fld id="{6130D9F5-3FA3-4911-BEB1-6E950BEF40EE}" type="datetimeFigureOut">
               <a:rPr lang="zh-TW" altLang="en-US" smtClean="0"/>
-              <a:t>2015/9/13</a:t>
+              <a:pPr/>
+              <a:t>9/13/15</a:t>
             </a:fld>
             <a:endParaRPr lang="zh-TW" altLang="en-US"/>
           </a:p>
@@ -3389,6 +3418,7 @@
           <a:p>
             <a:fld id="{C5C5FEA7-D34B-4903-B5C5-B5834C7353FC}" type="slidenum">
               <a:rPr lang="zh-TW" altLang="en-US" smtClean="0"/>
+              <a:pPr/>
               <a:t>‹#›</a:t>
             </a:fld>
             <a:endParaRPr lang="zh-TW" altLang="en-US"/>
@@ -3398,7 +3428,7 @@
     </p:spTree>
     <p:extLst>
       <p:ext uri="{BB962C8B-B14F-4D97-AF65-F5344CB8AC3E}">
-        <p14:creationId xmlns:p14="http://schemas.microsoft.com/office/powerpoint/2010/main" val="476946722"/>
+        <p14:creationId xmlns:p14="http://schemas.microsoft.com/office/powerpoint/2010/main" xmlns:p="http://schemas.openxmlformats.org/presentationml/2006/main" xmlns:r="http://schemas.openxmlformats.org/officeDocument/2006/relationships" xmlns:a="http://schemas.openxmlformats.org/drawingml/2006/main" xmlns="" val="476946722"/>
       </p:ext>
     </p:extLst>
   </p:cSld>
@@ -3701,7 +3731,7 @@
 </file>
 
 <file path=ppt/slides/slide1.xml><?xml version="1.0" encoding="utf-8"?>
-<p:sld xmlns:a="http://schemas.openxmlformats.org/drawingml/2006/main" xmlns:r="http://schemas.openxmlformats.org/officeDocument/2006/relationships" xmlns:p="http://schemas.openxmlformats.org/presentationml/2006/main">
+<p:sld xmlns:a="http://schemas.openxmlformats.org/drawingml/2006/main" xmlns:r="http://schemas.openxmlformats.org/officeDocument/2006/relationships" xmlns:mc="http://schemas.openxmlformats.org/markup-compatibility/2006" xmlns:mv="urn:schemas-microsoft-com:mac:vml" xmlns:p="http://schemas.openxmlformats.org/presentationml/2006/main" mc:Ignorable="mv" mc:PreserveAttributes="mv:*">
   <p:cSld>
     <p:spTree>
       <p:nvGrpSpPr>
@@ -3836,7 +3866,7 @@
           <a:blip r:embed="rId2">
             <a:extLst>
               <a:ext uri="{28A0092B-C50C-407E-A947-70E740481C1C}">
-                <a14:useLocalDpi xmlns:a14="http://schemas.microsoft.com/office/drawing/2010/main" val="0"/>
+                <a14:useLocalDpi xmlns:a14="http://schemas.microsoft.com/office/drawing/2010/main" xmlns:p="http://schemas.openxmlformats.org/presentationml/2006/main" xmlns:r="http://schemas.openxmlformats.org/officeDocument/2006/relationships" xmlns:a="http://schemas.openxmlformats.org/drawingml/2006/main" xmlns="" val="0"/>
               </a:ext>
             </a:extLst>
           </a:blip>
@@ -3866,7 +3896,7 @@
           <a:blip r:embed="rId3">
             <a:extLst>
               <a:ext uri="{28A0092B-C50C-407E-A947-70E740481C1C}">
-                <a14:useLocalDpi xmlns:a14="http://schemas.microsoft.com/office/drawing/2010/main" val="0"/>
+                <a14:useLocalDpi xmlns:a14="http://schemas.microsoft.com/office/drawing/2010/main" xmlns:p="http://schemas.openxmlformats.org/presentationml/2006/main" xmlns:r="http://schemas.openxmlformats.org/officeDocument/2006/relationships" xmlns:a="http://schemas.openxmlformats.org/drawingml/2006/main" xmlns="" val="0"/>
               </a:ext>
             </a:extLst>
           </a:blip>
@@ -3887,7 +3917,7 @@
     </p:spTree>
     <p:extLst>
       <p:ext uri="{BB962C8B-B14F-4D97-AF65-F5344CB8AC3E}">
-        <p14:creationId xmlns:p14="http://schemas.microsoft.com/office/powerpoint/2010/main" val="2120351739"/>
+        <p14:creationId xmlns:p14="http://schemas.microsoft.com/office/powerpoint/2010/main" xmlns:p="http://schemas.openxmlformats.org/presentationml/2006/main" xmlns:r="http://schemas.openxmlformats.org/officeDocument/2006/relationships" xmlns:a="http://schemas.openxmlformats.org/drawingml/2006/main" xmlns="" val="2120351739"/>
       </p:ext>
     </p:extLst>
   </p:cSld>
@@ -4022,7 +4052,7 @@
 </file>
 
 <file path=ppt/slides/slide10.xml><?xml version="1.0" encoding="utf-8"?>
-<p:sld xmlns:a="http://schemas.openxmlformats.org/drawingml/2006/main" xmlns:r="http://schemas.openxmlformats.org/officeDocument/2006/relationships" xmlns:p="http://schemas.openxmlformats.org/presentationml/2006/main">
+<p:sld xmlns:a="http://schemas.openxmlformats.org/drawingml/2006/main" xmlns:r="http://schemas.openxmlformats.org/officeDocument/2006/relationships" xmlns:mc="http://schemas.openxmlformats.org/markup-compatibility/2006" xmlns:mv="urn:schemas-microsoft-com:mac:vml" xmlns:p="http://schemas.openxmlformats.org/presentationml/2006/main" mc:Ignorable="mv" mc:PreserveAttributes="mv:*">
   <p:cSld>
     <p:spTree>
       <p:nvGrpSpPr>
@@ -4230,7 +4260,7 @@
           <a:blip r:embed="rId2">
             <a:extLst>
               <a:ext uri="{28A0092B-C50C-407E-A947-70E740481C1C}">
-                <a14:useLocalDpi xmlns:a14="http://schemas.microsoft.com/office/drawing/2010/main" val="0"/>
+                <a14:useLocalDpi xmlns:a14="http://schemas.microsoft.com/office/drawing/2010/main" xmlns:p="http://schemas.openxmlformats.org/presentationml/2006/main" xmlns:r="http://schemas.openxmlformats.org/officeDocument/2006/relationships" xmlns:a="http://schemas.openxmlformats.org/drawingml/2006/main" xmlns="" val="0"/>
               </a:ext>
             </a:extLst>
           </a:blip>
@@ -4260,7 +4290,7 @@
           <a:blip r:embed="rId3">
             <a:extLst>
               <a:ext uri="{28A0092B-C50C-407E-A947-70E740481C1C}">
-                <a14:useLocalDpi xmlns:a14="http://schemas.microsoft.com/office/drawing/2010/main" val="0"/>
+                <a14:useLocalDpi xmlns:a14="http://schemas.microsoft.com/office/drawing/2010/main" xmlns:p="http://schemas.openxmlformats.org/presentationml/2006/main" xmlns:r="http://schemas.openxmlformats.org/officeDocument/2006/relationships" xmlns:a="http://schemas.openxmlformats.org/drawingml/2006/main" xmlns="" val="0"/>
               </a:ext>
             </a:extLst>
           </a:blip>
@@ -4281,7 +4311,7 @@
     </p:spTree>
     <p:extLst>
       <p:ext uri="{BB962C8B-B14F-4D97-AF65-F5344CB8AC3E}">
-        <p14:creationId xmlns:p14="http://schemas.microsoft.com/office/powerpoint/2010/main" val="775248073"/>
+        <p14:creationId xmlns:p14="http://schemas.microsoft.com/office/powerpoint/2010/main" xmlns:p="http://schemas.openxmlformats.org/presentationml/2006/main" xmlns:r="http://schemas.openxmlformats.org/officeDocument/2006/relationships" xmlns:a="http://schemas.openxmlformats.org/drawingml/2006/main" xmlns="" val="775248073"/>
       </p:ext>
     </p:extLst>
   </p:cSld>
@@ -4299,7 +4329,7 @@
 </file>
 
 <file path=ppt/slides/slide11.xml><?xml version="1.0" encoding="utf-8"?>
-<p:sld xmlns:a="http://schemas.openxmlformats.org/drawingml/2006/main" xmlns:r="http://schemas.openxmlformats.org/officeDocument/2006/relationships" xmlns:p="http://schemas.openxmlformats.org/presentationml/2006/main">
+<p:sld xmlns:a="http://schemas.openxmlformats.org/drawingml/2006/main" xmlns:r="http://schemas.openxmlformats.org/officeDocument/2006/relationships" xmlns:mc="http://schemas.openxmlformats.org/markup-compatibility/2006" xmlns:mv="urn:schemas-microsoft-com:mac:vml" xmlns:p="http://schemas.openxmlformats.org/presentationml/2006/main" mc:Ignorable="mv" mc:PreserveAttributes="mv:*">
   <p:cSld>
     <p:spTree>
       <p:nvGrpSpPr>
@@ -4358,17 +4388,6 @@
               </a:rPr>
               <a:t>結</a:t>
             </a:r>
-            <a:endParaRPr lang="zh-TW" altLang="en-US" dirty="0">
-              <a:effectLst>
-                <a:outerShdw blurRad="38100" dist="38100" dir="2700000" algn="tl">
-                  <a:srgbClr val="000000">
-                    <a:alpha val="43137"/>
-                  </a:srgbClr>
-                </a:outerShdw>
-              </a:effectLst>
-              <a:latin typeface="微軟正黑體" panose="020B0604030504040204" pitchFamily="34" charset="-120"/>
-              <a:ea typeface="微軟正黑體" panose="020B0604030504040204" pitchFamily="34" charset="-120"/>
-            </a:endParaRPr>
           </a:p>
         </p:txBody>
       </p:sp>
@@ -4405,7 +4424,7 @@
           <a:blip r:embed="rId2">
             <a:extLst>
               <a:ext uri="{28A0092B-C50C-407E-A947-70E740481C1C}">
-                <a14:useLocalDpi xmlns:a14="http://schemas.microsoft.com/office/drawing/2010/main" val="0"/>
+                <a14:useLocalDpi xmlns:a14="http://schemas.microsoft.com/office/drawing/2010/main" xmlns:p="http://schemas.openxmlformats.org/presentationml/2006/main" xmlns:r="http://schemas.openxmlformats.org/officeDocument/2006/relationships" xmlns:a="http://schemas.openxmlformats.org/drawingml/2006/main" xmlns="" val="0"/>
               </a:ext>
             </a:extLst>
           </a:blip>
@@ -4632,7 +4651,7 @@
           <a:blip r:embed="rId3">
             <a:extLst>
               <a:ext uri="{28A0092B-C50C-407E-A947-70E740481C1C}">
-                <a14:useLocalDpi xmlns:a14="http://schemas.microsoft.com/office/drawing/2010/main" val="0"/>
+                <a14:useLocalDpi xmlns:a14="http://schemas.microsoft.com/office/drawing/2010/main" xmlns:p="http://schemas.openxmlformats.org/presentationml/2006/main" xmlns:r="http://schemas.openxmlformats.org/officeDocument/2006/relationships" xmlns:a="http://schemas.openxmlformats.org/drawingml/2006/main" xmlns="" val="0"/>
               </a:ext>
             </a:extLst>
           </a:blip>
@@ -4846,7 +4865,7 @@
           <a:blip r:embed="rId4">
             <a:extLst>
               <a:ext uri="{28A0092B-C50C-407E-A947-70E740481C1C}">
-                <a14:useLocalDpi xmlns:a14="http://schemas.microsoft.com/office/drawing/2010/main" val="0"/>
+                <a14:useLocalDpi xmlns:a14="http://schemas.microsoft.com/office/drawing/2010/main" xmlns:p="http://schemas.openxmlformats.org/presentationml/2006/main" xmlns:r="http://schemas.openxmlformats.org/officeDocument/2006/relationships" xmlns:a="http://schemas.openxmlformats.org/drawingml/2006/main" xmlns="" val="0"/>
               </a:ext>
             </a:extLst>
           </a:blip>
@@ -4876,7 +4895,7 @@
           <a:blip r:embed="rId5">
             <a:extLst>
               <a:ext uri="{28A0092B-C50C-407E-A947-70E740481C1C}">
-                <a14:useLocalDpi xmlns:a14="http://schemas.microsoft.com/office/drawing/2010/main" val="0"/>
+                <a14:useLocalDpi xmlns:a14="http://schemas.microsoft.com/office/drawing/2010/main" xmlns:p="http://schemas.openxmlformats.org/presentationml/2006/main" xmlns:r="http://schemas.openxmlformats.org/officeDocument/2006/relationships" xmlns:a="http://schemas.openxmlformats.org/drawingml/2006/main" xmlns="" val="0"/>
               </a:ext>
             </a:extLst>
           </a:blip>
@@ -4906,7 +4925,7 @@
           <a:blip r:embed="rId6">
             <a:extLst>
               <a:ext uri="{28A0092B-C50C-407E-A947-70E740481C1C}">
-                <a14:useLocalDpi xmlns:a14="http://schemas.microsoft.com/office/drawing/2010/main" val="0"/>
+                <a14:useLocalDpi xmlns:a14="http://schemas.microsoft.com/office/drawing/2010/main" xmlns:p="http://schemas.openxmlformats.org/presentationml/2006/main" xmlns:r="http://schemas.openxmlformats.org/officeDocument/2006/relationships" xmlns:a="http://schemas.openxmlformats.org/drawingml/2006/main" xmlns="" val="0"/>
               </a:ext>
             </a:extLst>
           </a:blip>
@@ -5095,7 +5114,7 @@
     </p:spTree>
     <p:extLst>
       <p:ext uri="{BB962C8B-B14F-4D97-AF65-F5344CB8AC3E}">
-        <p14:creationId xmlns:p14="http://schemas.microsoft.com/office/powerpoint/2010/main" val="410594843"/>
+        <p14:creationId xmlns:p14="http://schemas.microsoft.com/office/powerpoint/2010/main" xmlns:p="http://schemas.openxmlformats.org/presentationml/2006/main" xmlns:r="http://schemas.openxmlformats.org/officeDocument/2006/relationships" xmlns:a="http://schemas.openxmlformats.org/drawingml/2006/main" xmlns="" val="410594843"/>
       </p:ext>
     </p:extLst>
   </p:cSld>
@@ -5857,7 +5876,7 @@
 </file>
 
 <file path=ppt/slides/slide12.xml><?xml version="1.0" encoding="utf-8"?>
-<p:sld xmlns:a="http://schemas.openxmlformats.org/drawingml/2006/main" xmlns:r="http://schemas.openxmlformats.org/officeDocument/2006/relationships" xmlns:p="http://schemas.openxmlformats.org/presentationml/2006/main">
+<p:sld xmlns:a="http://schemas.openxmlformats.org/drawingml/2006/main" xmlns:r="http://schemas.openxmlformats.org/officeDocument/2006/relationships" xmlns:mc="http://schemas.openxmlformats.org/markup-compatibility/2006" xmlns:mv="urn:schemas-microsoft-com:mac:vml" xmlns:p="http://schemas.openxmlformats.org/presentationml/2006/main" mc:Ignorable="mv" mc:PreserveAttributes="mv:*">
   <p:cSld>
     <p:spTree>
       <p:nvGrpSpPr>
@@ -5957,7 +5976,7 @@
     </p:spTree>
     <p:extLst>
       <p:ext uri="{BB962C8B-B14F-4D97-AF65-F5344CB8AC3E}">
-        <p14:creationId xmlns:p14="http://schemas.microsoft.com/office/powerpoint/2010/main" val="1239414516"/>
+        <p14:creationId xmlns:p14="http://schemas.microsoft.com/office/powerpoint/2010/main" xmlns:p="http://schemas.openxmlformats.org/presentationml/2006/main" xmlns:r="http://schemas.openxmlformats.org/officeDocument/2006/relationships" xmlns:a="http://schemas.openxmlformats.org/drawingml/2006/main" xmlns="" val="1239414516"/>
       </p:ext>
     </p:extLst>
   </p:cSld>
@@ -5975,7 +5994,7 @@
 </file>
 
 <file path=ppt/slides/slide13.xml><?xml version="1.0" encoding="utf-8"?>
-<p:sld xmlns:a="http://schemas.openxmlformats.org/drawingml/2006/main" xmlns:r="http://schemas.openxmlformats.org/officeDocument/2006/relationships" xmlns:p="http://schemas.openxmlformats.org/presentationml/2006/main">
+<p:sld xmlns:a="http://schemas.openxmlformats.org/drawingml/2006/main" xmlns:r="http://schemas.openxmlformats.org/officeDocument/2006/relationships" xmlns:mc="http://schemas.openxmlformats.org/markup-compatibility/2006" xmlns:mv="urn:schemas-microsoft-com:mac:vml" xmlns:p="http://schemas.openxmlformats.org/presentationml/2006/main" mc:Ignorable="mv" mc:PreserveAttributes="mv:*">
   <p:cSld>
     <p:spTree>
       <p:nvGrpSpPr>
@@ -6035,7 +6054,7 @@
           <a:blip r:embed="rId2">
             <a:extLst>
               <a:ext uri="{28A0092B-C50C-407E-A947-70E740481C1C}">
-                <a14:useLocalDpi xmlns:a14="http://schemas.microsoft.com/office/drawing/2010/main" val="0"/>
+                <a14:useLocalDpi xmlns:a14="http://schemas.microsoft.com/office/drawing/2010/main" xmlns:p="http://schemas.openxmlformats.org/presentationml/2006/main" xmlns:r="http://schemas.openxmlformats.org/officeDocument/2006/relationships" xmlns:a="http://schemas.openxmlformats.org/drawingml/2006/main" xmlns="" val="0"/>
               </a:ext>
             </a:extLst>
           </a:blip>
@@ -6072,7 +6091,7 @@
           <a:blip r:embed="rId3">
             <a:extLst>
               <a:ext uri="{28A0092B-C50C-407E-A947-70E740481C1C}">
-                <a14:useLocalDpi xmlns:a14="http://schemas.microsoft.com/office/drawing/2010/main" val="0"/>
+                <a14:useLocalDpi xmlns:a14="http://schemas.microsoft.com/office/drawing/2010/main" xmlns:p="http://schemas.openxmlformats.org/presentationml/2006/main" xmlns:r="http://schemas.openxmlformats.org/officeDocument/2006/relationships" xmlns:a="http://schemas.openxmlformats.org/drawingml/2006/main" xmlns="" val="0"/>
               </a:ext>
             </a:extLst>
           </a:blip>
@@ -6461,7 +6480,7 @@
     </p:spTree>
     <p:extLst>
       <p:ext uri="{BB962C8B-B14F-4D97-AF65-F5344CB8AC3E}">
-        <p14:creationId xmlns:p14="http://schemas.microsoft.com/office/powerpoint/2010/main" val="1622413178"/>
+        <p14:creationId xmlns:p14="http://schemas.microsoft.com/office/powerpoint/2010/main" xmlns:p="http://schemas.openxmlformats.org/presentationml/2006/main" xmlns:r="http://schemas.openxmlformats.org/officeDocument/2006/relationships" xmlns:a="http://schemas.openxmlformats.org/drawingml/2006/main" xmlns="" val="1622413178"/>
       </p:ext>
     </p:extLst>
   </p:cSld>
@@ -6754,7 +6773,7 @@
 </file>
 
 <file path=ppt/slides/slide14.xml><?xml version="1.0" encoding="utf-8"?>
-<p:sld xmlns:a="http://schemas.openxmlformats.org/drawingml/2006/main" xmlns:r="http://schemas.openxmlformats.org/officeDocument/2006/relationships" xmlns:p="http://schemas.openxmlformats.org/presentationml/2006/main">
+<p:sld xmlns:a="http://schemas.openxmlformats.org/drawingml/2006/main" xmlns:r="http://schemas.openxmlformats.org/officeDocument/2006/relationships" xmlns:mc="http://schemas.openxmlformats.org/markup-compatibility/2006" xmlns:mv="urn:schemas-microsoft-com:mac:vml" xmlns:p="http://schemas.openxmlformats.org/presentationml/2006/main" mc:Ignorable="mv" mc:PreserveAttributes="mv:*">
   <p:cSld>
     <p:spTree>
       <p:nvGrpSpPr>
@@ -6814,7 +6833,7 @@
           <a:blip r:embed="rId2">
             <a:extLst>
               <a:ext uri="{28A0092B-C50C-407E-A947-70E740481C1C}">
-                <a14:useLocalDpi xmlns:a14="http://schemas.microsoft.com/office/drawing/2010/main" val="0"/>
+                <a14:useLocalDpi xmlns:a14="http://schemas.microsoft.com/office/drawing/2010/main" xmlns:p="http://schemas.openxmlformats.org/presentationml/2006/main" xmlns:r="http://schemas.openxmlformats.org/officeDocument/2006/relationships" xmlns:a="http://schemas.openxmlformats.org/drawingml/2006/main" xmlns="" val="0"/>
               </a:ext>
             </a:extLst>
           </a:blip>
@@ -6851,7 +6870,7 @@
           <a:blip r:embed="rId3">
             <a:extLst>
               <a:ext uri="{28A0092B-C50C-407E-A947-70E740481C1C}">
-                <a14:useLocalDpi xmlns:a14="http://schemas.microsoft.com/office/drawing/2010/main" val="0"/>
+                <a14:useLocalDpi xmlns:a14="http://schemas.microsoft.com/office/drawing/2010/main" xmlns:p="http://schemas.openxmlformats.org/presentationml/2006/main" xmlns:r="http://schemas.openxmlformats.org/officeDocument/2006/relationships" xmlns:a="http://schemas.openxmlformats.org/drawingml/2006/main" xmlns="" val="0"/>
               </a:ext>
             </a:extLst>
           </a:blip>
@@ -7319,7 +7338,7 @@
     </p:spTree>
     <p:extLst>
       <p:ext uri="{BB962C8B-B14F-4D97-AF65-F5344CB8AC3E}">
-        <p14:creationId xmlns:p14="http://schemas.microsoft.com/office/powerpoint/2010/main" val="1471940619"/>
+        <p14:creationId xmlns:p14="http://schemas.microsoft.com/office/powerpoint/2010/main" xmlns:p="http://schemas.openxmlformats.org/presentationml/2006/main" xmlns:r="http://schemas.openxmlformats.org/officeDocument/2006/relationships" xmlns:a="http://schemas.openxmlformats.org/drawingml/2006/main" xmlns="" val="1471940619"/>
       </p:ext>
     </p:extLst>
   </p:cSld>
@@ -7737,7 +7756,7 @@
 </file>
 
 <file path=ppt/slides/slide15.xml><?xml version="1.0" encoding="utf-8"?>
-<p:sld xmlns:a="http://schemas.openxmlformats.org/drawingml/2006/main" xmlns:r="http://schemas.openxmlformats.org/officeDocument/2006/relationships" xmlns:p="http://schemas.openxmlformats.org/presentationml/2006/main">
+<p:sld xmlns:a="http://schemas.openxmlformats.org/drawingml/2006/main" xmlns:r="http://schemas.openxmlformats.org/officeDocument/2006/relationships" xmlns:mc="http://schemas.openxmlformats.org/markup-compatibility/2006" xmlns:mv="urn:schemas-microsoft-com:mac:vml" xmlns:p="http://schemas.openxmlformats.org/presentationml/2006/main" mc:Ignorable="mv" mc:PreserveAttributes="mv:*">
   <p:cSld>
     <p:spTree>
       <p:nvGrpSpPr>
@@ -7797,7 +7816,7 @@
           <a:blip r:embed="rId2">
             <a:extLst>
               <a:ext uri="{28A0092B-C50C-407E-A947-70E740481C1C}">
-                <a14:useLocalDpi xmlns:a14="http://schemas.microsoft.com/office/drawing/2010/main" val="0"/>
+                <a14:useLocalDpi xmlns:a14="http://schemas.microsoft.com/office/drawing/2010/main" xmlns:p="http://schemas.openxmlformats.org/presentationml/2006/main" xmlns:r="http://schemas.openxmlformats.org/officeDocument/2006/relationships" xmlns:a="http://schemas.openxmlformats.org/drawingml/2006/main" xmlns="" val="0"/>
               </a:ext>
             </a:extLst>
           </a:blip>
@@ -7834,7 +7853,7 @@
           <a:blip r:embed="rId3">
             <a:extLst>
               <a:ext uri="{28A0092B-C50C-407E-A947-70E740481C1C}">
-                <a14:useLocalDpi xmlns:a14="http://schemas.microsoft.com/office/drawing/2010/main" val="0"/>
+                <a14:useLocalDpi xmlns:a14="http://schemas.microsoft.com/office/drawing/2010/main" xmlns:p="http://schemas.openxmlformats.org/presentationml/2006/main" xmlns:r="http://schemas.openxmlformats.org/officeDocument/2006/relationships" xmlns:a="http://schemas.openxmlformats.org/drawingml/2006/main" xmlns="" val="0"/>
               </a:ext>
             </a:extLst>
           </a:blip>
@@ -8108,7 +8127,7 @@
     </p:spTree>
     <p:extLst>
       <p:ext uri="{BB962C8B-B14F-4D97-AF65-F5344CB8AC3E}">
-        <p14:creationId xmlns:p14="http://schemas.microsoft.com/office/powerpoint/2010/main" val="808144488"/>
+        <p14:creationId xmlns:p14="http://schemas.microsoft.com/office/powerpoint/2010/main" xmlns:p="http://schemas.openxmlformats.org/presentationml/2006/main" xmlns:r="http://schemas.openxmlformats.org/officeDocument/2006/relationships" xmlns:a="http://schemas.openxmlformats.org/drawingml/2006/main" xmlns="" val="808144488"/>
       </p:ext>
     </p:extLst>
   </p:cSld>
@@ -8365,7 +8384,7 @@
 </file>
 
 <file path=ppt/slides/slide16.xml><?xml version="1.0" encoding="utf-8"?>
-<p:sld xmlns:a="http://schemas.openxmlformats.org/drawingml/2006/main" xmlns:r="http://schemas.openxmlformats.org/officeDocument/2006/relationships" xmlns:p="http://schemas.openxmlformats.org/presentationml/2006/main">
+<p:sld xmlns:a="http://schemas.openxmlformats.org/drawingml/2006/main" xmlns:r="http://schemas.openxmlformats.org/officeDocument/2006/relationships" xmlns:mc="http://schemas.openxmlformats.org/markup-compatibility/2006" xmlns:mv="urn:schemas-microsoft-com:mac:vml" xmlns:p="http://schemas.openxmlformats.org/presentationml/2006/main" mc:Ignorable="mv" mc:PreserveAttributes="mv:*">
   <p:cSld>
     <p:spTree>
       <p:nvGrpSpPr>
@@ -8425,7 +8444,7 @@
           <a:blip r:embed="rId2">
             <a:extLst>
               <a:ext uri="{28A0092B-C50C-407E-A947-70E740481C1C}">
-                <a14:useLocalDpi xmlns:a14="http://schemas.microsoft.com/office/drawing/2010/main" val="0"/>
+                <a14:useLocalDpi xmlns:a14="http://schemas.microsoft.com/office/drawing/2010/main" xmlns:p="http://schemas.openxmlformats.org/presentationml/2006/main" xmlns:r="http://schemas.openxmlformats.org/officeDocument/2006/relationships" xmlns:a="http://schemas.openxmlformats.org/drawingml/2006/main" xmlns="" val="0"/>
               </a:ext>
             </a:extLst>
           </a:blip>
@@ -8462,7 +8481,7 @@
           <a:blip r:embed="rId3">
             <a:extLst>
               <a:ext uri="{28A0092B-C50C-407E-A947-70E740481C1C}">
-                <a14:useLocalDpi xmlns:a14="http://schemas.microsoft.com/office/drawing/2010/main" val="0"/>
+                <a14:useLocalDpi xmlns:a14="http://schemas.microsoft.com/office/drawing/2010/main" xmlns:p="http://schemas.openxmlformats.org/presentationml/2006/main" xmlns:r="http://schemas.openxmlformats.org/officeDocument/2006/relationships" xmlns:a="http://schemas.openxmlformats.org/drawingml/2006/main" xmlns="" val="0"/>
               </a:ext>
             </a:extLst>
           </a:blip>
@@ -8992,7 +9011,7 @@
     </p:spTree>
     <p:extLst>
       <p:ext uri="{BB962C8B-B14F-4D97-AF65-F5344CB8AC3E}">
-        <p14:creationId xmlns:p14="http://schemas.microsoft.com/office/powerpoint/2010/main" val="1439361105"/>
+        <p14:creationId xmlns:p14="http://schemas.microsoft.com/office/powerpoint/2010/main" xmlns:p="http://schemas.openxmlformats.org/presentationml/2006/main" xmlns:r="http://schemas.openxmlformats.org/officeDocument/2006/relationships" xmlns:a="http://schemas.openxmlformats.org/drawingml/2006/main" xmlns="" val="1439361105"/>
       </p:ext>
     </p:extLst>
   </p:cSld>
@@ -9410,7 +9429,7 @@
 </file>
 
 <file path=ppt/slides/slide2.xml><?xml version="1.0" encoding="utf-8"?>
-<p:sld xmlns:a="http://schemas.openxmlformats.org/drawingml/2006/main" xmlns:r="http://schemas.openxmlformats.org/officeDocument/2006/relationships" xmlns:p="http://schemas.openxmlformats.org/presentationml/2006/main">
+<p:sld xmlns:a="http://schemas.openxmlformats.org/drawingml/2006/main" xmlns:r="http://schemas.openxmlformats.org/officeDocument/2006/relationships" xmlns:mc="http://schemas.openxmlformats.org/markup-compatibility/2006" xmlns:mv="urn:schemas-microsoft-com:mac:vml" xmlns:p="http://schemas.openxmlformats.org/presentationml/2006/main" mc:Ignorable="mv" mc:PreserveAttributes="mv:*">
   <p:cSld>
     <p:spTree>
       <p:nvGrpSpPr>
@@ -9598,7 +9617,7 @@
           <a:blip r:embed="rId2">
             <a:extLst>
               <a:ext uri="{28A0092B-C50C-407E-A947-70E740481C1C}">
-                <a14:useLocalDpi xmlns:a14="http://schemas.microsoft.com/office/drawing/2010/main" val="0"/>
+                <a14:useLocalDpi xmlns:a14="http://schemas.microsoft.com/office/drawing/2010/main" xmlns:p="http://schemas.openxmlformats.org/presentationml/2006/main" xmlns:r="http://schemas.openxmlformats.org/officeDocument/2006/relationships" xmlns:a="http://schemas.openxmlformats.org/drawingml/2006/main" xmlns="" val="0"/>
               </a:ext>
             </a:extLst>
           </a:blip>
@@ -9628,7 +9647,7 @@
           <a:blip r:embed="rId3">
             <a:extLst>
               <a:ext uri="{28A0092B-C50C-407E-A947-70E740481C1C}">
-                <a14:useLocalDpi xmlns:a14="http://schemas.microsoft.com/office/drawing/2010/main" val="0"/>
+                <a14:useLocalDpi xmlns:a14="http://schemas.microsoft.com/office/drawing/2010/main" xmlns:p="http://schemas.openxmlformats.org/presentationml/2006/main" xmlns:r="http://schemas.openxmlformats.org/officeDocument/2006/relationships" xmlns:a="http://schemas.openxmlformats.org/drawingml/2006/main" xmlns="" val="0"/>
               </a:ext>
             </a:extLst>
           </a:blip>
@@ -9649,7 +9668,7 @@
     </p:spTree>
     <p:extLst>
       <p:ext uri="{BB962C8B-B14F-4D97-AF65-F5344CB8AC3E}">
-        <p14:creationId xmlns:p14="http://schemas.microsoft.com/office/powerpoint/2010/main" val="1374115647"/>
+        <p14:creationId xmlns:p14="http://schemas.microsoft.com/office/powerpoint/2010/main" xmlns:p="http://schemas.openxmlformats.org/presentationml/2006/main" xmlns:r="http://schemas.openxmlformats.org/officeDocument/2006/relationships" xmlns:a="http://schemas.openxmlformats.org/drawingml/2006/main" xmlns="" val="1374115647"/>
       </p:ext>
     </p:extLst>
   </p:cSld>
@@ -9667,7 +9686,7 @@
 </file>
 
 <file path=ppt/slides/slide3.xml><?xml version="1.0" encoding="utf-8"?>
-<p:sld xmlns:a="http://schemas.openxmlformats.org/drawingml/2006/main" xmlns:r="http://schemas.openxmlformats.org/officeDocument/2006/relationships" xmlns:p="http://schemas.openxmlformats.org/presentationml/2006/main">
+<p:sld xmlns:a="http://schemas.openxmlformats.org/drawingml/2006/main" xmlns:r="http://schemas.openxmlformats.org/officeDocument/2006/relationships" xmlns:mc="http://schemas.openxmlformats.org/markup-compatibility/2006" xmlns:mv="urn:schemas-microsoft-com:mac:vml" xmlns:p="http://schemas.openxmlformats.org/presentationml/2006/main" mc:Ignorable="mv" mc:PreserveAttributes="mv:*">
   <p:cSld>
     <p:spTree>
       <p:nvGrpSpPr>
@@ -9877,7 +9896,7 @@
           <a:blip r:embed="rId2">
             <a:extLst>
               <a:ext uri="{28A0092B-C50C-407E-A947-70E740481C1C}">
-                <a14:useLocalDpi xmlns:a14="http://schemas.microsoft.com/office/drawing/2010/main" val="0"/>
+                <a14:useLocalDpi xmlns:a14="http://schemas.microsoft.com/office/drawing/2010/main" xmlns:p="http://schemas.openxmlformats.org/presentationml/2006/main" xmlns:r="http://schemas.openxmlformats.org/officeDocument/2006/relationships" xmlns:a="http://schemas.openxmlformats.org/drawingml/2006/main" xmlns="" val="0"/>
               </a:ext>
             </a:extLst>
           </a:blip>
@@ -9907,7 +9926,7 @@
           <a:blip r:embed="rId3">
             <a:extLst>
               <a:ext uri="{28A0092B-C50C-407E-A947-70E740481C1C}">
-                <a14:useLocalDpi xmlns:a14="http://schemas.microsoft.com/office/drawing/2010/main" val="0"/>
+                <a14:useLocalDpi xmlns:a14="http://schemas.microsoft.com/office/drawing/2010/main" xmlns:p="http://schemas.openxmlformats.org/presentationml/2006/main" xmlns:r="http://schemas.openxmlformats.org/officeDocument/2006/relationships" xmlns:a="http://schemas.openxmlformats.org/drawingml/2006/main" xmlns="" val="0"/>
               </a:ext>
             </a:extLst>
           </a:blip>
@@ -9928,7 +9947,7 @@
     </p:spTree>
     <p:extLst>
       <p:ext uri="{BB962C8B-B14F-4D97-AF65-F5344CB8AC3E}">
-        <p14:creationId xmlns:p14="http://schemas.microsoft.com/office/powerpoint/2010/main" val="1944387117"/>
+        <p14:creationId xmlns:p14="http://schemas.microsoft.com/office/powerpoint/2010/main" xmlns:p="http://schemas.openxmlformats.org/presentationml/2006/main" xmlns:r="http://schemas.openxmlformats.org/officeDocument/2006/relationships" xmlns:a="http://schemas.openxmlformats.org/drawingml/2006/main" xmlns="" val="1944387117"/>
       </p:ext>
     </p:extLst>
   </p:cSld>
@@ -9946,7 +9965,7 @@
 </file>
 
 <file path=ppt/slides/slide4.xml><?xml version="1.0" encoding="utf-8"?>
-<p:sld xmlns:a="http://schemas.openxmlformats.org/drawingml/2006/main" xmlns:r="http://schemas.openxmlformats.org/officeDocument/2006/relationships" xmlns:p="http://schemas.openxmlformats.org/presentationml/2006/main">
+<p:sld xmlns:a="http://schemas.openxmlformats.org/drawingml/2006/main" xmlns:r="http://schemas.openxmlformats.org/officeDocument/2006/relationships" xmlns:mc="http://schemas.openxmlformats.org/markup-compatibility/2006" xmlns:mv="urn:schemas-microsoft-com:mac:vml" xmlns:p="http://schemas.openxmlformats.org/presentationml/2006/main" mc:Ignorable="mv" mc:PreserveAttributes="mv:*">
   <p:cSld>
     <p:spTree>
       <p:nvGrpSpPr>
@@ -10027,7 +10046,7 @@
           <a:blip r:embed="rId2">
             <a:extLst>
               <a:ext uri="{28A0092B-C50C-407E-A947-70E740481C1C}">
-                <a14:useLocalDpi xmlns:a14="http://schemas.microsoft.com/office/drawing/2010/main" val="0"/>
+                <a14:useLocalDpi xmlns:a14="http://schemas.microsoft.com/office/drawing/2010/main" xmlns:p="http://schemas.openxmlformats.org/presentationml/2006/main" xmlns:r="http://schemas.openxmlformats.org/officeDocument/2006/relationships" xmlns:a="http://schemas.openxmlformats.org/drawingml/2006/main" xmlns="" val="0"/>
               </a:ext>
             </a:extLst>
           </a:blip>
@@ -10064,7 +10083,7 @@
           <a:blip r:embed="rId3">
             <a:extLst>
               <a:ext uri="{28A0092B-C50C-407E-A947-70E740481C1C}">
-                <a14:useLocalDpi xmlns:a14="http://schemas.microsoft.com/office/drawing/2010/main" val="0"/>
+                <a14:useLocalDpi xmlns:a14="http://schemas.microsoft.com/office/drawing/2010/main" xmlns:p="http://schemas.openxmlformats.org/presentationml/2006/main" xmlns:r="http://schemas.openxmlformats.org/officeDocument/2006/relationships" xmlns:a="http://schemas.openxmlformats.org/drawingml/2006/main" xmlns="" val="0"/>
               </a:ext>
             </a:extLst>
           </a:blip>
@@ -10094,7 +10113,7 @@
           <a:blip r:embed="rId4">
             <a:extLst>
               <a:ext uri="{28A0092B-C50C-407E-A947-70E740481C1C}">
-                <a14:useLocalDpi xmlns:a14="http://schemas.microsoft.com/office/drawing/2010/main" val="0"/>
+                <a14:useLocalDpi xmlns:a14="http://schemas.microsoft.com/office/drawing/2010/main" xmlns:p="http://schemas.openxmlformats.org/presentationml/2006/main" xmlns:r="http://schemas.openxmlformats.org/officeDocument/2006/relationships" xmlns:a="http://schemas.openxmlformats.org/drawingml/2006/main" xmlns="" val="0"/>
               </a:ext>
             </a:extLst>
           </a:blip>
@@ -10124,7 +10143,7 @@
           <a:blip r:embed="rId5">
             <a:extLst>
               <a:ext uri="{28A0092B-C50C-407E-A947-70E740481C1C}">
-                <a14:useLocalDpi xmlns:a14="http://schemas.microsoft.com/office/drawing/2010/main" val="0"/>
+                <a14:useLocalDpi xmlns:a14="http://schemas.microsoft.com/office/drawing/2010/main" xmlns:p="http://schemas.openxmlformats.org/presentationml/2006/main" xmlns:r="http://schemas.openxmlformats.org/officeDocument/2006/relationships" xmlns:a="http://schemas.openxmlformats.org/drawingml/2006/main" xmlns="" val="0"/>
               </a:ext>
             </a:extLst>
           </a:blip>
@@ -10529,7 +10548,7 @@
     </p:spTree>
     <p:extLst>
       <p:ext uri="{BB962C8B-B14F-4D97-AF65-F5344CB8AC3E}">
-        <p14:creationId xmlns:p14="http://schemas.microsoft.com/office/powerpoint/2010/main" val="3646146908"/>
+        <p14:creationId xmlns:p14="http://schemas.microsoft.com/office/powerpoint/2010/main" xmlns:p="http://schemas.openxmlformats.org/presentationml/2006/main" xmlns:r="http://schemas.openxmlformats.org/officeDocument/2006/relationships" xmlns:a="http://schemas.openxmlformats.org/drawingml/2006/main" xmlns="" val="3646146908"/>
       </p:ext>
     </p:extLst>
   </p:cSld>
@@ -10986,7 +11005,7 @@
 </file>
 
 <file path=ppt/slides/slide5.xml><?xml version="1.0" encoding="utf-8"?>
-<p:sld xmlns:a="http://schemas.openxmlformats.org/drawingml/2006/main" xmlns:r="http://schemas.openxmlformats.org/officeDocument/2006/relationships" xmlns:p="http://schemas.openxmlformats.org/presentationml/2006/main">
+<p:sld xmlns:a="http://schemas.openxmlformats.org/drawingml/2006/main" xmlns:r="http://schemas.openxmlformats.org/officeDocument/2006/relationships" xmlns:mc="http://schemas.openxmlformats.org/markup-compatibility/2006" xmlns:mv="urn:schemas-microsoft-com:mac:vml" xmlns:p="http://schemas.openxmlformats.org/presentationml/2006/main" mc:Ignorable="mv" mc:PreserveAttributes="mv:*">
   <p:cSld>
     <p:spTree>
       <p:nvGrpSpPr>
@@ -11196,7 +11215,7 @@
           <a:blip r:embed="rId2">
             <a:extLst>
               <a:ext uri="{28A0092B-C50C-407E-A947-70E740481C1C}">
-                <a14:useLocalDpi xmlns:a14="http://schemas.microsoft.com/office/drawing/2010/main" val="0"/>
+                <a14:useLocalDpi xmlns:a14="http://schemas.microsoft.com/office/drawing/2010/main" xmlns:p="http://schemas.openxmlformats.org/presentationml/2006/main" xmlns:r="http://schemas.openxmlformats.org/officeDocument/2006/relationships" xmlns:a="http://schemas.openxmlformats.org/drawingml/2006/main" xmlns="" val="0"/>
               </a:ext>
             </a:extLst>
           </a:blip>
@@ -11226,7 +11245,7 @@
           <a:blip r:embed="rId3">
             <a:extLst>
               <a:ext uri="{28A0092B-C50C-407E-A947-70E740481C1C}">
-                <a14:useLocalDpi xmlns:a14="http://schemas.microsoft.com/office/drawing/2010/main" val="0"/>
+                <a14:useLocalDpi xmlns:a14="http://schemas.microsoft.com/office/drawing/2010/main" xmlns:p="http://schemas.openxmlformats.org/presentationml/2006/main" xmlns:r="http://schemas.openxmlformats.org/officeDocument/2006/relationships" xmlns:a="http://schemas.openxmlformats.org/drawingml/2006/main" xmlns="" val="0"/>
               </a:ext>
             </a:extLst>
           </a:blip>
@@ -11247,7 +11266,7 @@
     </p:spTree>
     <p:extLst>
       <p:ext uri="{BB962C8B-B14F-4D97-AF65-F5344CB8AC3E}">
-        <p14:creationId xmlns:p14="http://schemas.microsoft.com/office/powerpoint/2010/main" val="72104560"/>
+        <p14:creationId xmlns:p14="http://schemas.microsoft.com/office/powerpoint/2010/main" xmlns:p="http://schemas.openxmlformats.org/presentationml/2006/main" xmlns:r="http://schemas.openxmlformats.org/officeDocument/2006/relationships" xmlns:a="http://schemas.openxmlformats.org/drawingml/2006/main" xmlns="" val="72104560"/>
       </p:ext>
     </p:extLst>
   </p:cSld>
@@ -11265,7 +11284,7 @@
 </file>
 
 <file path=ppt/slides/slide6.xml><?xml version="1.0" encoding="utf-8"?>
-<p:sld xmlns:a="http://schemas.openxmlformats.org/drawingml/2006/main" xmlns:r="http://schemas.openxmlformats.org/officeDocument/2006/relationships" xmlns:p="http://schemas.openxmlformats.org/presentationml/2006/main">
+<p:sld xmlns:a="http://schemas.openxmlformats.org/drawingml/2006/main" xmlns:r="http://schemas.openxmlformats.org/officeDocument/2006/relationships" xmlns:mc="http://schemas.openxmlformats.org/markup-compatibility/2006" xmlns:mv="urn:schemas-microsoft-com:mac:vml" xmlns:p="http://schemas.openxmlformats.org/presentationml/2006/main" mc:Ignorable="mv" mc:PreserveAttributes="mv:*">
   <p:cSld>
     <p:spTree>
       <p:nvGrpSpPr>
@@ -11357,7 +11376,7 @@
           <a:blip r:embed="rId2">
             <a:extLst>
               <a:ext uri="{28A0092B-C50C-407E-A947-70E740481C1C}">
-                <a14:useLocalDpi xmlns:a14="http://schemas.microsoft.com/office/drawing/2010/main" val="0"/>
+                <a14:useLocalDpi xmlns:a14="http://schemas.microsoft.com/office/drawing/2010/main" xmlns:p="http://schemas.openxmlformats.org/presentationml/2006/main" xmlns:r="http://schemas.openxmlformats.org/officeDocument/2006/relationships" xmlns:a="http://schemas.openxmlformats.org/drawingml/2006/main" xmlns="" val="0"/>
               </a:ext>
             </a:extLst>
           </a:blip>
@@ -11584,7 +11603,7 @@
           <a:blip r:embed="rId3">
             <a:extLst>
               <a:ext uri="{28A0092B-C50C-407E-A947-70E740481C1C}">
-                <a14:useLocalDpi xmlns:a14="http://schemas.microsoft.com/office/drawing/2010/main" val="0"/>
+                <a14:useLocalDpi xmlns:a14="http://schemas.microsoft.com/office/drawing/2010/main" xmlns:p="http://schemas.openxmlformats.org/presentationml/2006/main" xmlns:r="http://schemas.openxmlformats.org/officeDocument/2006/relationships" xmlns:a="http://schemas.openxmlformats.org/drawingml/2006/main" xmlns="" val="0"/>
               </a:ext>
             </a:extLst>
           </a:blip>
@@ -11798,7 +11817,7 @@
           <a:blip r:embed="rId4">
             <a:extLst>
               <a:ext uri="{28A0092B-C50C-407E-A947-70E740481C1C}">
-                <a14:useLocalDpi xmlns:a14="http://schemas.microsoft.com/office/drawing/2010/main" val="0"/>
+                <a14:useLocalDpi xmlns:a14="http://schemas.microsoft.com/office/drawing/2010/main" xmlns:p="http://schemas.openxmlformats.org/presentationml/2006/main" xmlns:r="http://schemas.openxmlformats.org/officeDocument/2006/relationships" xmlns:a="http://schemas.openxmlformats.org/drawingml/2006/main" xmlns="" val="0"/>
               </a:ext>
             </a:extLst>
           </a:blip>
@@ -11828,7 +11847,7 @@
           <a:blip r:embed="rId5">
             <a:extLst>
               <a:ext uri="{28A0092B-C50C-407E-A947-70E740481C1C}">
-                <a14:useLocalDpi xmlns:a14="http://schemas.microsoft.com/office/drawing/2010/main" val="0"/>
+                <a14:useLocalDpi xmlns:a14="http://schemas.microsoft.com/office/drawing/2010/main" xmlns:p="http://schemas.openxmlformats.org/presentationml/2006/main" xmlns:r="http://schemas.openxmlformats.org/officeDocument/2006/relationships" xmlns:a="http://schemas.openxmlformats.org/drawingml/2006/main" xmlns="" val="0"/>
               </a:ext>
             </a:extLst>
           </a:blip>
@@ -11858,7 +11877,7 @@
           <a:blip r:embed="rId6">
             <a:extLst>
               <a:ext uri="{28A0092B-C50C-407E-A947-70E740481C1C}">
-                <a14:useLocalDpi xmlns:a14="http://schemas.microsoft.com/office/drawing/2010/main" val="0"/>
+                <a14:useLocalDpi xmlns:a14="http://schemas.microsoft.com/office/drawing/2010/main" xmlns:p="http://schemas.openxmlformats.org/presentationml/2006/main" xmlns:r="http://schemas.openxmlformats.org/officeDocument/2006/relationships" xmlns:a="http://schemas.openxmlformats.org/drawingml/2006/main" xmlns="" val="0"/>
               </a:ext>
             </a:extLst>
           </a:blip>
@@ -11939,7 +11958,7 @@
     </p:spTree>
     <p:extLst>
       <p:ext uri="{BB962C8B-B14F-4D97-AF65-F5344CB8AC3E}">
-        <p14:creationId xmlns:p14="http://schemas.microsoft.com/office/powerpoint/2010/main" val="293648263"/>
+        <p14:creationId xmlns:p14="http://schemas.microsoft.com/office/powerpoint/2010/main" xmlns:p="http://schemas.openxmlformats.org/presentationml/2006/main" xmlns:r="http://schemas.openxmlformats.org/officeDocument/2006/relationships" xmlns:a="http://schemas.openxmlformats.org/drawingml/2006/main" xmlns="" val="293648263"/>
       </p:ext>
     </p:extLst>
   </p:cSld>
@@ -12593,7 +12612,7 @@
 </file>
 
 <file path=ppt/slides/slide7.xml><?xml version="1.0" encoding="utf-8"?>
-<p:sld xmlns:a="http://schemas.openxmlformats.org/drawingml/2006/main" xmlns:r="http://schemas.openxmlformats.org/officeDocument/2006/relationships" xmlns:p="http://schemas.openxmlformats.org/presentationml/2006/main">
+<p:sld xmlns:a="http://schemas.openxmlformats.org/drawingml/2006/main" xmlns:r="http://schemas.openxmlformats.org/officeDocument/2006/relationships" xmlns:mc="http://schemas.openxmlformats.org/markup-compatibility/2006" xmlns:mv="urn:schemas-microsoft-com:mac:vml" xmlns:p="http://schemas.openxmlformats.org/presentationml/2006/main" mc:Ignorable="mv" mc:PreserveAttributes="mv:*">
   <p:cSld>
     <p:spTree>
       <p:nvGrpSpPr>
@@ -12801,7 +12820,7 @@
           <a:blip r:embed="rId2">
             <a:extLst>
               <a:ext uri="{28A0092B-C50C-407E-A947-70E740481C1C}">
-                <a14:useLocalDpi xmlns:a14="http://schemas.microsoft.com/office/drawing/2010/main" val="0"/>
+                <a14:useLocalDpi xmlns:a14="http://schemas.microsoft.com/office/drawing/2010/main" xmlns:p="http://schemas.openxmlformats.org/presentationml/2006/main" xmlns:r="http://schemas.openxmlformats.org/officeDocument/2006/relationships" xmlns:a="http://schemas.openxmlformats.org/drawingml/2006/main" xmlns="" val="0"/>
               </a:ext>
             </a:extLst>
           </a:blip>
@@ -12831,7 +12850,7 @@
           <a:blip r:embed="rId3">
             <a:extLst>
               <a:ext uri="{28A0092B-C50C-407E-A947-70E740481C1C}">
-                <a14:useLocalDpi xmlns:a14="http://schemas.microsoft.com/office/drawing/2010/main" val="0"/>
+                <a14:useLocalDpi xmlns:a14="http://schemas.microsoft.com/office/drawing/2010/main" xmlns:p="http://schemas.openxmlformats.org/presentationml/2006/main" xmlns:r="http://schemas.openxmlformats.org/officeDocument/2006/relationships" xmlns:a="http://schemas.openxmlformats.org/drawingml/2006/main" xmlns="" val="0"/>
               </a:ext>
             </a:extLst>
           </a:blip>
@@ -12852,7 +12871,7 @@
     </p:spTree>
     <p:extLst>
       <p:ext uri="{BB962C8B-B14F-4D97-AF65-F5344CB8AC3E}">
-        <p14:creationId xmlns:p14="http://schemas.microsoft.com/office/powerpoint/2010/main" val="102104723"/>
+        <p14:creationId xmlns:p14="http://schemas.microsoft.com/office/powerpoint/2010/main" xmlns:p="http://schemas.openxmlformats.org/presentationml/2006/main" xmlns:r="http://schemas.openxmlformats.org/officeDocument/2006/relationships" xmlns:a="http://schemas.openxmlformats.org/drawingml/2006/main" xmlns="" val="102104723"/>
       </p:ext>
     </p:extLst>
   </p:cSld>
@@ -12870,7 +12889,7 @@
 </file>
 
 <file path=ppt/slides/slide8.xml><?xml version="1.0" encoding="utf-8"?>
-<p:sld xmlns:a="http://schemas.openxmlformats.org/drawingml/2006/main" xmlns:r="http://schemas.openxmlformats.org/officeDocument/2006/relationships" xmlns:p="http://schemas.openxmlformats.org/presentationml/2006/main">
+<p:sld xmlns:a="http://schemas.openxmlformats.org/drawingml/2006/main" xmlns:r="http://schemas.openxmlformats.org/officeDocument/2006/relationships" xmlns:mc="http://schemas.openxmlformats.org/markup-compatibility/2006" xmlns:mv="urn:schemas-microsoft-com:mac:vml" xmlns:p="http://schemas.openxmlformats.org/presentationml/2006/main" mc:Ignorable="mv" mc:PreserveAttributes="mv:*">
   <p:cSld>
     <p:spTree>
       <p:nvGrpSpPr>
@@ -13080,7 +13099,7 @@
           <a:blip r:embed="rId2">
             <a:extLst>
               <a:ext uri="{28A0092B-C50C-407E-A947-70E740481C1C}">
-                <a14:useLocalDpi xmlns:a14="http://schemas.microsoft.com/office/drawing/2010/main" val="0"/>
+                <a14:useLocalDpi xmlns:a14="http://schemas.microsoft.com/office/drawing/2010/main" xmlns:p="http://schemas.openxmlformats.org/presentationml/2006/main" xmlns:r="http://schemas.openxmlformats.org/officeDocument/2006/relationships" xmlns:a="http://schemas.openxmlformats.org/drawingml/2006/main" xmlns="" val="0"/>
               </a:ext>
             </a:extLst>
           </a:blip>
@@ -13110,7 +13129,7 @@
           <a:blip r:embed="rId3">
             <a:extLst>
               <a:ext uri="{28A0092B-C50C-407E-A947-70E740481C1C}">
-                <a14:useLocalDpi xmlns:a14="http://schemas.microsoft.com/office/drawing/2010/main" val="0"/>
+                <a14:useLocalDpi xmlns:a14="http://schemas.microsoft.com/office/drawing/2010/main" xmlns:p="http://schemas.openxmlformats.org/presentationml/2006/main" xmlns:r="http://schemas.openxmlformats.org/officeDocument/2006/relationships" xmlns:a="http://schemas.openxmlformats.org/drawingml/2006/main" xmlns="" val="0"/>
               </a:ext>
             </a:extLst>
           </a:blip>
@@ -13131,7 +13150,7 @@
     </p:spTree>
     <p:extLst>
       <p:ext uri="{BB962C8B-B14F-4D97-AF65-F5344CB8AC3E}">
-        <p14:creationId xmlns:p14="http://schemas.microsoft.com/office/powerpoint/2010/main" val="1292464830"/>
+        <p14:creationId xmlns:p14="http://schemas.microsoft.com/office/powerpoint/2010/main" xmlns:p="http://schemas.openxmlformats.org/presentationml/2006/main" xmlns:r="http://schemas.openxmlformats.org/officeDocument/2006/relationships" xmlns:a="http://schemas.openxmlformats.org/drawingml/2006/main" xmlns="" val="1292464830"/>
       </p:ext>
     </p:extLst>
   </p:cSld>
@@ -13149,7 +13168,7 @@
 </file>
 
 <file path=ppt/slides/slide9.xml><?xml version="1.0" encoding="utf-8"?>
-<p:sld xmlns:a="http://schemas.openxmlformats.org/drawingml/2006/main" xmlns:r="http://schemas.openxmlformats.org/officeDocument/2006/relationships" xmlns:p="http://schemas.openxmlformats.org/presentationml/2006/main">
+<p:sld xmlns:a="http://schemas.openxmlformats.org/drawingml/2006/main" xmlns:r="http://schemas.openxmlformats.org/officeDocument/2006/relationships" xmlns:mc="http://schemas.openxmlformats.org/markup-compatibility/2006" xmlns:mv="urn:schemas-microsoft-com:mac:vml" xmlns:p="http://schemas.openxmlformats.org/presentationml/2006/main" mc:Ignorable="mv" mc:PreserveAttributes="mv:*">
   <p:cSld>
     <p:spTree>
       <p:nvGrpSpPr>
@@ -13225,7 +13244,39 @@
           </a:bodyPr>
           <a:lstStyle/>
           <a:p>
-            <a:endParaRPr lang="zh-TW" altLang="en-US" dirty="0"/>
+            <a:r>
+              <a:rPr lang="en-US" altLang="zh-TW" dirty="0" smtClean="0"/>
+              <a:t>Algorithm</a:t>
+            </a:r>
+            <a:endParaRPr lang="en-US" altLang="zh-TW" dirty="0" smtClean="0"/>
+          </a:p>
+          <a:p>
+            <a:pPr lvl="1"/>
+            <a:r>
+              <a:rPr lang="en-US" altLang="zh-TW" dirty="0" smtClean="0"/>
+              <a:t>Location Filtering </a:t>
+            </a:r>
+          </a:p>
+          <a:p>
+            <a:r>
+              <a:rPr lang="en-US" altLang="zh-TW" dirty="0" smtClean="0"/>
+              <a:t>Web</a:t>
+            </a:r>
+          </a:p>
+          <a:p>
+            <a:pPr lvl="1"/>
+            <a:r>
+              <a:rPr lang="en-US" altLang="zh-TW" dirty="0" smtClean="0"/>
+              <a:t>HTML+CSS</a:t>
+            </a:r>
+          </a:p>
+          <a:p>
+            <a:pPr lvl="1"/>
+            <a:r>
+              <a:rPr lang="en-US" altLang="zh-TW" dirty="0" smtClean="0"/>
+              <a:t>JavaScript</a:t>
+            </a:r>
+            <a:endParaRPr lang="en-US" altLang="zh-TW" dirty="0" smtClean="0"/>
           </a:p>
         </p:txBody>
       </p:sp>
@@ -13241,7 +13292,7 @@
           <a:blip r:embed="rId2">
             <a:extLst>
               <a:ext uri="{28A0092B-C50C-407E-A947-70E740481C1C}">
-                <a14:useLocalDpi xmlns:a14="http://schemas.microsoft.com/office/drawing/2010/main" val="0"/>
+                <a14:useLocalDpi xmlns:a14="http://schemas.microsoft.com/office/drawing/2010/main" xmlns:p="http://schemas.openxmlformats.org/presentationml/2006/main" xmlns:r="http://schemas.openxmlformats.org/officeDocument/2006/relationships" xmlns:a="http://schemas.openxmlformats.org/drawingml/2006/main" xmlns="" val="0"/>
               </a:ext>
             </a:extLst>
           </a:blip>
@@ -13266,10 +13317,311 @@
           </a:effectLst>
         </p:spPr>
       </p:pic>
+      <p:sp>
+        <p:nvSpPr>
+          <p:cNvPr id="6" name="內容版面配置區 2"/>
+          <p:cNvSpPr txBox="1">
+            <a:spLocks/>
+          </p:cNvSpPr>
+          <p:nvPr/>
+        </p:nvSpPr>
+        <p:spPr>
+          <a:xfrm>
+            <a:off x="6883400" y="1876425"/>
+            <a:ext cx="3810000" cy="4351338"/>
+          </a:xfrm>
+          <a:prstGeom prst="rect">
+            <a:avLst/>
+          </a:prstGeom>
+        </p:spPr>
+        <p:txBody>
+          <a:bodyPr vert="horz" lIns="91440" tIns="45720" rIns="91440" bIns="45720" rtlCol="0">
+            <a:normAutofit/>
+          </a:bodyPr>
+          <a:lstStyle/>
+          <a:p>
+            <a:pPr marL="228600" marR="0" lvl="0" indent="-228600" algn="l" defTabSz="914400" rtl="0" eaLnBrk="1" fontAlgn="auto" latinLnBrk="0" hangingPunct="1">
+              <a:lnSpc>
+                <a:spcPct val="90000"/>
+              </a:lnSpc>
+              <a:spcBef>
+                <a:spcPts val="1000"/>
+              </a:spcBef>
+              <a:spcAft>
+                <a:spcPts val="0"/>
+              </a:spcAft>
+              <a:buClrTx/>
+              <a:buSzTx/>
+              <a:buFont typeface="Arial" panose="020B0604020202020204" pitchFamily="34" charset="0"/>
+              <a:buChar char="•"/>
+              <a:tabLst/>
+              <a:defRPr/>
+            </a:pPr>
+            <a:r>
+              <a:rPr kumimoji="0" lang="en-US" altLang="zh-TW" sz="2800" b="0" i="0" u="none" strike="noStrike" kern="1200" cap="none" spc="0" normalizeH="0" baseline="0" noProof="0" dirty="0" smtClean="0">
+                <a:ln>
+                  <a:noFill/>
+                </a:ln>
+                <a:solidFill>
+                  <a:schemeClr val="tx1"/>
+                </a:solidFill>
+                <a:effectLst/>
+                <a:uLnTx/>
+                <a:uFillTx/>
+                <a:latin typeface="+mn-lt"/>
+                <a:ea typeface="+mn-ea"/>
+                <a:cs typeface="+mn-cs"/>
+              </a:rPr>
+              <a:t>Server</a:t>
+            </a:r>
+          </a:p>
+          <a:p>
+            <a:pPr marL="685800" marR="0" lvl="1" indent="-228600" algn="l" defTabSz="914400" rtl="0" eaLnBrk="1" fontAlgn="auto" latinLnBrk="0" hangingPunct="1">
+              <a:lnSpc>
+                <a:spcPct val="90000"/>
+              </a:lnSpc>
+              <a:spcBef>
+                <a:spcPts val="500"/>
+              </a:spcBef>
+              <a:spcAft>
+                <a:spcPts val="0"/>
+              </a:spcAft>
+              <a:buClrTx/>
+              <a:buSzTx/>
+              <a:buFont typeface="Arial" panose="020B0604020202020204" pitchFamily="34" charset="0"/>
+              <a:buChar char="•"/>
+              <a:tabLst/>
+              <a:defRPr/>
+            </a:pPr>
+            <a:r>
+              <a:rPr kumimoji="0" lang="en-US" altLang="zh-TW" sz="2400" b="0" i="0" u="none" strike="noStrike" kern="1200" cap="none" spc="0" normalizeH="0" baseline="0" noProof="0" dirty="0" smtClean="0">
+                <a:ln>
+                  <a:noFill/>
+                </a:ln>
+                <a:solidFill>
+                  <a:schemeClr val="tx1"/>
+                </a:solidFill>
+                <a:effectLst/>
+                <a:uLnTx/>
+                <a:uFillTx/>
+                <a:latin typeface="+mn-lt"/>
+                <a:ea typeface="+mn-ea"/>
+                <a:cs typeface="+mn-cs"/>
+              </a:rPr>
+              <a:t>Amazon EC2</a:t>
+            </a:r>
+          </a:p>
+          <a:p>
+            <a:pPr marL="685800" marR="0" lvl="1" indent="-228600" algn="l" defTabSz="914400" rtl="0" eaLnBrk="1" fontAlgn="auto" latinLnBrk="0" hangingPunct="1">
+              <a:lnSpc>
+                <a:spcPct val="90000"/>
+              </a:lnSpc>
+              <a:spcBef>
+                <a:spcPts val="500"/>
+              </a:spcBef>
+              <a:spcAft>
+                <a:spcPts val="0"/>
+              </a:spcAft>
+              <a:buClrTx/>
+              <a:buSzTx/>
+              <a:buFont typeface="Arial" panose="020B0604020202020204" pitchFamily="34" charset="0"/>
+              <a:buChar char="•"/>
+              <a:tabLst/>
+              <a:defRPr/>
+            </a:pPr>
+            <a:r>
+              <a:rPr kumimoji="0" lang="en-US" altLang="zh-TW" sz="2400" b="0" i="0" u="none" strike="noStrike" kern="1200" cap="none" spc="0" normalizeH="0" baseline="0" noProof="0" dirty="0" smtClean="0">
+                <a:ln>
+                  <a:noFill/>
+                </a:ln>
+                <a:solidFill>
+                  <a:schemeClr val="tx1"/>
+                </a:solidFill>
+                <a:effectLst/>
+                <a:uLnTx/>
+                <a:uFillTx/>
+                <a:latin typeface="+mn-lt"/>
+                <a:ea typeface="+mn-ea"/>
+                <a:cs typeface="+mn-cs"/>
+              </a:rPr>
+              <a:t>Apache</a:t>
+            </a:r>
+          </a:p>
+          <a:p>
+            <a:pPr marL="685800" marR="0" lvl="1" indent="-228600" algn="l" defTabSz="914400" rtl="0" eaLnBrk="1" fontAlgn="auto" latinLnBrk="0" hangingPunct="1">
+              <a:lnSpc>
+                <a:spcPct val="90000"/>
+              </a:lnSpc>
+              <a:spcBef>
+                <a:spcPts val="500"/>
+              </a:spcBef>
+              <a:spcAft>
+                <a:spcPts val="0"/>
+              </a:spcAft>
+              <a:buClrTx/>
+              <a:buSzTx/>
+              <a:buFont typeface="Arial" panose="020B0604020202020204" pitchFamily="34" charset="0"/>
+              <a:buChar char="•"/>
+              <a:tabLst/>
+              <a:defRPr/>
+            </a:pPr>
+            <a:r>
+              <a:rPr kumimoji="0" lang="en-US" altLang="zh-TW" sz="2400" b="0" i="0" u="none" strike="noStrike" kern="1200" cap="none" spc="0" normalizeH="0" baseline="0" noProof="0" dirty="0" err="1" smtClean="0">
+                <a:ln>
+                  <a:noFill/>
+                </a:ln>
+                <a:solidFill>
+                  <a:schemeClr val="tx1"/>
+                </a:solidFill>
+                <a:effectLst/>
+                <a:uLnTx/>
+                <a:uFillTx/>
+                <a:latin typeface="+mn-lt"/>
+                <a:ea typeface="+mn-ea"/>
+                <a:cs typeface="+mn-cs"/>
+              </a:rPr>
+              <a:t>MySQL</a:t>
+            </a:r>
+            <a:endParaRPr kumimoji="0" lang="en-US" altLang="zh-TW" sz="2400" b="0" i="0" u="none" strike="noStrike" kern="1200" cap="none" spc="0" normalizeH="0" baseline="0" noProof="0" dirty="0" smtClean="0">
+              <a:ln>
+                <a:noFill/>
+              </a:ln>
+              <a:solidFill>
+                <a:schemeClr val="tx1"/>
+              </a:solidFill>
+              <a:effectLst/>
+              <a:uLnTx/>
+              <a:uFillTx/>
+              <a:latin typeface="+mn-lt"/>
+              <a:ea typeface="+mn-ea"/>
+              <a:cs typeface="+mn-cs"/>
+            </a:endParaRPr>
+          </a:p>
+          <a:p>
+            <a:pPr marL="685800" marR="0" lvl="1" indent="-228600" algn="l" defTabSz="914400" rtl="0" eaLnBrk="1" fontAlgn="auto" latinLnBrk="0" hangingPunct="1">
+              <a:lnSpc>
+                <a:spcPct val="90000"/>
+              </a:lnSpc>
+              <a:spcBef>
+                <a:spcPts val="500"/>
+              </a:spcBef>
+              <a:spcAft>
+                <a:spcPts val="0"/>
+              </a:spcAft>
+              <a:buClrTx/>
+              <a:buSzTx/>
+              <a:buFont typeface="Arial" panose="020B0604020202020204" pitchFamily="34" charset="0"/>
+              <a:buChar char="•"/>
+              <a:tabLst/>
+              <a:defRPr/>
+            </a:pPr>
+            <a:r>
+              <a:rPr kumimoji="0" lang="en-US" altLang="zh-TW" sz="2400" b="0" i="0" u="none" strike="noStrike" kern="1200" cap="none" spc="0" normalizeH="0" baseline="0" noProof="0" dirty="0" smtClean="0">
+                <a:ln>
+                  <a:noFill/>
+                </a:ln>
+                <a:solidFill>
+                  <a:schemeClr val="tx1"/>
+                </a:solidFill>
+                <a:effectLst/>
+                <a:uLnTx/>
+                <a:uFillTx/>
+                <a:latin typeface="+mn-lt"/>
+                <a:ea typeface="+mn-ea"/>
+                <a:cs typeface="+mn-cs"/>
+              </a:rPr>
+              <a:t>Python</a:t>
+            </a:r>
+          </a:p>
+          <a:p>
+            <a:pPr marL="685800" marR="0" lvl="1" indent="-228600" algn="l" defTabSz="914400" rtl="0" eaLnBrk="1" fontAlgn="auto" latinLnBrk="0" hangingPunct="1">
+              <a:lnSpc>
+                <a:spcPct val="90000"/>
+              </a:lnSpc>
+              <a:spcBef>
+                <a:spcPts val="500"/>
+              </a:spcBef>
+              <a:spcAft>
+                <a:spcPts val="0"/>
+              </a:spcAft>
+              <a:buClrTx/>
+              <a:buSzTx/>
+              <a:buFont typeface="Arial" panose="020B0604020202020204" pitchFamily="34" charset="0"/>
+              <a:buChar char="•"/>
+              <a:tabLst/>
+              <a:defRPr/>
+            </a:pPr>
+            <a:r>
+              <a:rPr kumimoji="0" lang="en-US" altLang="zh-TW" sz="2400" b="0" i="0" u="none" strike="noStrike" kern="1200" cap="none" spc="0" normalizeH="0" baseline="0" noProof="0" dirty="0" err="1" smtClean="0">
+                <a:ln>
+                  <a:noFill/>
+                </a:ln>
+                <a:solidFill>
+                  <a:schemeClr val="tx1"/>
+                </a:solidFill>
+                <a:effectLst/>
+                <a:uLnTx/>
+                <a:uFillTx/>
+                <a:latin typeface="+mn-lt"/>
+                <a:ea typeface="+mn-ea"/>
+                <a:cs typeface="+mn-cs"/>
+              </a:rPr>
+              <a:t>Ternado</a:t>
+            </a:r>
+            <a:endParaRPr kumimoji="0" lang="en-US" altLang="zh-TW" sz="2400" b="0" i="0" u="none" strike="noStrike" kern="1200" cap="none" spc="0" normalizeH="0" baseline="0" noProof="0" dirty="0" smtClean="0">
+              <a:ln>
+                <a:noFill/>
+              </a:ln>
+              <a:solidFill>
+                <a:schemeClr val="tx1"/>
+              </a:solidFill>
+              <a:effectLst/>
+              <a:uLnTx/>
+              <a:uFillTx/>
+              <a:latin typeface="+mn-lt"/>
+              <a:ea typeface="+mn-ea"/>
+              <a:cs typeface="+mn-cs"/>
+            </a:endParaRPr>
+          </a:p>
+          <a:p>
+            <a:pPr marL="685800" marR="0" lvl="1" indent="-228600" algn="l" defTabSz="914400" rtl="0" eaLnBrk="1" fontAlgn="auto" latinLnBrk="0" hangingPunct="1">
+              <a:lnSpc>
+                <a:spcPct val="90000"/>
+              </a:lnSpc>
+              <a:spcBef>
+                <a:spcPts val="500"/>
+              </a:spcBef>
+              <a:spcAft>
+                <a:spcPts val="0"/>
+              </a:spcAft>
+              <a:buClrTx/>
+              <a:buSzTx/>
+              <a:buFont typeface="Arial" panose="020B0604020202020204" pitchFamily="34" charset="0"/>
+              <a:buChar char="•"/>
+              <a:tabLst/>
+              <a:defRPr/>
+            </a:pPr>
+            <a:endParaRPr kumimoji="0" lang="zh-TW" altLang="en-US" sz="2400" b="0" i="0" u="none" strike="noStrike" kern="1200" cap="none" spc="0" normalizeH="0" baseline="0" noProof="0" dirty="0">
+              <a:ln>
+                <a:noFill/>
+              </a:ln>
+              <a:solidFill>
+                <a:schemeClr val="tx1"/>
+              </a:solidFill>
+              <a:effectLst/>
+              <a:uLnTx/>
+              <a:uFillTx/>
+              <a:latin typeface="+mn-lt"/>
+              <a:ea typeface="+mn-ea"/>
+              <a:cs typeface="+mn-cs"/>
+            </a:endParaRPr>
+          </a:p>
+        </p:txBody>
+      </p:sp>
     </p:spTree>
     <p:extLst>
       <p:ext uri="{BB962C8B-B14F-4D97-AF65-F5344CB8AC3E}">
-        <p14:creationId xmlns:p14="http://schemas.microsoft.com/office/powerpoint/2010/main" val="3437044462"/>
+        <p14:creationId xmlns:p14="http://schemas.microsoft.com/office/powerpoint/2010/main" xmlns:p="http://schemas.openxmlformats.org/presentationml/2006/main" xmlns:r="http://schemas.openxmlformats.org/officeDocument/2006/relationships" xmlns:a="http://schemas.openxmlformats.org/drawingml/2006/main" xmlns="" val="3437044462"/>
       </p:ext>
     </p:extLst>
   </p:cSld>
@@ -13329,7 +13681,7 @@
     </a:clrScheme>
     <a:fontScheme name="Office">
       <a:majorFont>
-        <a:latin typeface="Calibri Light" panose="020F0302020204030204"/>
+        <a:latin typeface="Calibri Light"/>
         <a:ea typeface=""/>
         <a:cs typeface=""/>
         <a:font script="Jpan" typeface="ＭＳ Ｐゴシック"/>
@@ -13364,7 +13716,7 @@
         <a:font script="Geor" typeface="Sylfaen"/>
       </a:majorFont>
       <a:minorFont>
-        <a:latin typeface="Calibri" panose="020F0502020204030204"/>
+        <a:latin typeface="Calibri"/>
         <a:ea typeface=""/>
         <a:cs typeface=""/>
         <a:font script="Jpan" typeface="ＭＳ Ｐゴシック"/>
@@ -13541,7 +13893,7 @@
   <a:extraClrSchemeLst/>
   <a:extLst>
     <a:ext uri="{05A4C25C-085E-4340-85A3-A5531E510DB2}">
-      <thm15:themeFamily xmlns:thm15="http://schemas.microsoft.com/office/thememl/2012/main" name="Office Theme" id="{62F939B6-93AF-4DB8-9C6B-D6C7DFDC589F}" vid="{4A3C46E8-61CC-4603-A589-7422A47A8E4A}"/>
+      <thm15:themeFamily xmlns:thm15="http://schemas.microsoft.com/office/thememl/2012/main" xmlns:a="http://schemas.openxmlformats.org/drawingml/2006/main" xmlns="" name="Office Theme" id="{62F939B6-93AF-4DB8-9C6B-D6C7DFDC589F}" vid="{4A3C46E8-61CC-4603-A589-7422A47A8E4A}"/>
     </a:ext>
   </a:extLst>
 </a:theme>
@@ -13590,7 +13942,7 @@
     </a:clrScheme>
     <a:fontScheme name="Office">
       <a:majorFont>
-        <a:latin typeface="Calibri Light" panose="020F0302020204030204"/>
+        <a:latin typeface="Calibri Light"/>
         <a:ea typeface=""/>
         <a:cs typeface=""/>
         <a:font script="Jpan" typeface="ＭＳ Ｐゴシック"/>
@@ -13625,7 +13977,7 @@
         <a:font script="Geor" typeface="Sylfaen"/>
       </a:majorFont>
       <a:minorFont>
-        <a:latin typeface="Calibri" panose="020F0502020204030204"/>
+        <a:latin typeface="Calibri"/>
         <a:ea typeface=""/>
         <a:cs typeface=""/>
         <a:font script="Jpan" typeface="ＭＳ Ｐゴシック"/>
@@ -13802,7 +14154,7 @@
   <a:extraClrSchemeLst/>
   <a:extLst>
     <a:ext uri="{05A4C25C-085E-4340-85A3-A5531E510DB2}">
-      <thm15:themeFamily xmlns:thm15="http://schemas.microsoft.com/office/thememl/2012/main" name="Office Theme" id="{62F939B6-93AF-4DB8-9C6B-D6C7DFDC589F}" vid="{4A3C46E8-61CC-4603-A589-7422A47A8E4A}"/>
+      <thm15:themeFamily xmlns:thm15="http://schemas.microsoft.com/office/thememl/2012/main" xmlns:a="http://schemas.openxmlformats.org/drawingml/2006/main" xmlns="" name="Office Theme" id="{62F939B6-93AF-4DB8-9C6B-D6C7DFDC589F}" vid="{4A3C46E8-61CC-4603-A589-7422A47A8E4A}"/>
     </a:ext>
   </a:extLst>
 </a:theme>
@@ -13851,7 +14203,7 @@
     </a:clrScheme>
     <a:fontScheme name="Office">
       <a:majorFont>
-        <a:latin typeface="Calibri Light" panose="020F0302020204030204"/>
+        <a:latin typeface="Calibri Light"/>
         <a:ea typeface=""/>
         <a:cs typeface=""/>
         <a:font script="Jpan" typeface="ＭＳ Ｐゴシック"/>
@@ -13886,7 +14238,7 @@
         <a:font script="Geor" typeface="Sylfaen"/>
       </a:majorFont>
       <a:minorFont>
-        <a:latin typeface="Calibri" panose="020F0502020204030204"/>
+        <a:latin typeface="Calibri"/>
         <a:ea typeface=""/>
         <a:cs typeface=""/>
         <a:font script="Jpan" typeface="ＭＳ Ｐゴシック"/>
@@ -14063,7 +14415,7 @@
   <a:extraClrSchemeLst/>
   <a:extLst>
     <a:ext uri="{05A4C25C-085E-4340-85A3-A5531E510DB2}">
-      <thm15:themeFamily xmlns:thm15="http://schemas.microsoft.com/office/thememl/2012/main" name="Office Theme" id="{62F939B6-93AF-4DB8-9C6B-D6C7DFDC589F}" vid="{4A3C46E8-61CC-4603-A589-7422A47A8E4A}"/>
+      <thm15:themeFamily xmlns:thm15="http://schemas.microsoft.com/office/thememl/2012/main" xmlns:a="http://schemas.openxmlformats.org/drawingml/2006/main" xmlns="" name="Office Theme" id="{62F939B6-93AF-4DB8-9C6B-D6C7DFDC589F}" vid="{4A3C46E8-61CC-4603-A589-7422A47A8E4A}"/>
     </a:ext>
   </a:extLst>
 </a:theme>

</xml_diff>